<commit_message>
changed pptx hope this can be final
</commit_message>
<xml_diff>
--- a/DirectMarket.pptx
+++ b/DirectMarket.pptx
@@ -2680,7 +2680,7 @@
             <a:rPr lang="en-US" dirty="0">
               <a:latin typeface="Adobe Caslon Pro" panose="0205050205050A020403" pitchFamily="18" charset="77"/>
             </a:rPr>
-            <a:t> value =  0.926</a:t>
+            <a:t> value =  0.931</a:t>
           </a:r>
         </a:p>
       </dgm:t>
@@ -3621,7 +3621,7 @@
             <a:rPr lang="en-US" sz="2900" kern="1200" dirty="0">
               <a:latin typeface="Adobe Caslon Pro" panose="0205050205050A020403" pitchFamily="18" charset="77"/>
             </a:rPr>
-            <a:t> value =  0.926</a:t>
+            <a:t> value =  0.931</a:t>
           </a:r>
         </a:p>
       </dsp:txBody>
@@ -8773,7 +8773,7 @@
           <a:p>
             <a:fld id="{326951E3-958F-4611-B170-D081BA0250F9}" type="datetimeFigureOut">
               <a:rPr lang="en-US" smtClean="0"/>
-              <a:t>10/7/21</a:t>
+              <a:t>10/8/21</a:t>
             </a:fld>
             <a:endParaRPr lang="en-US"/>
           </a:p>
@@ -8943,7 +8943,7 @@
           <a:p>
             <a:fld id="{326951E3-958F-4611-B170-D081BA0250F9}" type="datetimeFigureOut">
               <a:rPr lang="en-US" smtClean="0"/>
-              <a:t>10/7/21</a:t>
+              <a:t>10/8/21</a:t>
             </a:fld>
             <a:endParaRPr lang="en-US"/>
           </a:p>
@@ -9123,7 +9123,7 @@
           <a:p>
             <a:fld id="{326951E3-958F-4611-B170-D081BA0250F9}" type="datetimeFigureOut">
               <a:rPr lang="en-US" smtClean="0"/>
-              <a:t>10/7/21</a:t>
+              <a:t>10/8/21</a:t>
             </a:fld>
             <a:endParaRPr lang="en-US"/>
           </a:p>
@@ -9332,7 +9332,7 @@
             <a:fld id="{326951E3-958F-4611-B170-D081BA0250F9}" type="datetimeFigureOut">
               <a:rPr lang="en-US" smtClean="0"/>
               <a:pPr/>
-              <a:t>10/7/21</a:t>
+              <a:t>10/8/21</a:t>
             </a:fld>
             <a:endParaRPr lang="en-US"/>
           </a:p>
@@ -9589,7 +9589,7 @@
           <a:p>
             <a:fld id="{326951E3-958F-4611-B170-D081BA0250F9}" type="datetimeFigureOut">
               <a:rPr lang="en-US" smtClean="0"/>
-              <a:t>10/7/21</a:t>
+              <a:t>10/8/21</a:t>
             </a:fld>
             <a:endParaRPr lang="en-US"/>
           </a:p>
@@ -9821,7 +9821,7 @@
           <a:p>
             <a:fld id="{326951E3-958F-4611-B170-D081BA0250F9}" type="datetimeFigureOut">
               <a:rPr lang="en-US" smtClean="0"/>
-              <a:t>10/7/21</a:t>
+              <a:t>10/8/21</a:t>
             </a:fld>
             <a:endParaRPr lang="en-US"/>
           </a:p>
@@ -10188,7 +10188,7 @@
           <a:p>
             <a:fld id="{326951E3-958F-4611-B170-D081BA0250F9}" type="datetimeFigureOut">
               <a:rPr lang="en-US" smtClean="0"/>
-              <a:t>10/7/21</a:t>
+              <a:t>10/8/21</a:t>
             </a:fld>
             <a:endParaRPr lang="en-US"/>
           </a:p>
@@ -10306,7 +10306,7 @@
           <a:p>
             <a:fld id="{326951E3-958F-4611-B170-D081BA0250F9}" type="datetimeFigureOut">
               <a:rPr lang="en-US" smtClean="0"/>
-              <a:t>10/7/21</a:t>
+              <a:t>10/8/21</a:t>
             </a:fld>
             <a:endParaRPr lang="en-US"/>
           </a:p>
@@ -10401,7 +10401,7 @@
           <a:p>
             <a:fld id="{326951E3-958F-4611-B170-D081BA0250F9}" type="datetimeFigureOut">
               <a:rPr lang="en-US" smtClean="0"/>
-              <a:t>10/7/21</a:t>
+              <a:t>10/8/21</a:t>
             </a:fld>
             <a:endParaRPr lang="en-US"/>
           </a:p>
@@ -10678,7 +10678,7 @@
           <a:p>
             <a:fld id="{326951E3-958F-4611-B170-D081BA0250F9}" type="datetimeFigureOut">
               <a:rPr lang="en-US" smtClean="0"/>
-              <a:t>10/7/21</a:t>
+              <a:t>10/8/21</a:t>
             </a:fld>
             <a:endParaRPr lang="en-US"/>
           </a:p>
@@ -10935,7 +10935,7 @@
           <a:p>
             <a:fld id="{326951E3-958F-4611-B170-D081BA0250F9}" type="datetimeFigureOut">
               <a:rPr lang="en-US" smtClean="0"/>
-              <a:t>10/7/21</a:t>
+              <a:t>10/8/21</a:t>
             </a:fld>
             <a:endParaRPr lang="en-US"/>
           </a:p>
@@ -11149,7 +11149,7 @@
             <a:fld id="{326951E3-958F-4611-B170-D081BA0250F9}" type="datetimeFigureOut">
               <a:rPr lang="en-US" smtClean="0"/>
               <a:pPr/>
-              <a:t>10/7/21</a:t>
+              <a:t>10/8/21</a:t>
             </a:fld>
             <a:endParaRPr lang="en-US" dirty="0"/>
           </a:p>
@@ -12801,10 +12801,10 @@
       </p:sp>
       <p:pic>
         <p:nvPicPr>
-          <p:cNvPr id="1030" name="Picture 6">
+          <p:cNvPr id="1028" name="Picture 4">
             <a:extLst>
               <a:ext uri="{FF2B5EF4-FFF2-40B4-BE49-F238E27FC236}">
-                <a16:creationId xmlns:a16="http://schemas.microsoft.com/office/drawing/2014/main" id="{F63069AD-E0A9-9349-8C75-F3B4E38C64C9}"/>
+                <a16:creationId xmlns:a16="http://schemas.microsoft.com/office/drawing/2014/main" id="{F5EBC453-74A0-524F-9543-A9D84A3DCE6F}"/>
               </a:ext>
             </a:extLst>
           </p:cNvPr>
@@ -12821,13 +12821,13 @@
               </a:ext>
             </a:extLst>
           </a:blip>
-          <a:srcRect t="9683"/>
+          <a:srcRect t="9002"/>
           <a:stretch/>
         </p:blipFill>
         <p:spPr bwMode="auto">
           <a:xfrm>
-            <a:off x="1085851" y="2393527"/>
-            <a:ext cx="6291982" cy="3915833"/>
+            <a:off x="1635358" y="2148113"/>
+            <a:ext cx="5873284" cy="4310743"/>
           </a:xfrm>
           <a:prstGeom prst="rect">
             <a:avLst/>
@@ -13236,10 +13236,10 @@
       </p:sp>
       <p:pic>
         <p:nvPicPr>
-          <p:cNvPr id="3076" name="Picture 4">
+          <p:cNvPr id="2050" name="Picture 2">
             <a:extLst>
               <a:ext uri="{FF2B5EF4-FFF2-40B4-BE49-F238E27FC236}">
-                <a16:creationId xmlns:a16="http://schemas.microsoft.com/office/drawing/2014/main" id="{8524E2CC-06B2-B94C-B871-EC832480C038}"/>
+                <a16:creationId xmlns:a16="http://schemas.microsoft.com/office/drawing/2014/main" id="{493600F8-3162-AD49-B160-490718E16537}"/>
               </a:ext>
             </a:extLst>
           </p:cNvPr>
@@ -13248,7 +13248,7 @@
           </p:cNvPicPr>
           <p:nvPr/>
         </p:nvPicPr>
-        <p:blipFill rotWithShape="1">
+        <p:blipFill>
           <a:blip r:embed="rId2">
             <a:extLst>
               <a:ext uri="{28A0092B-C50C-407E-A947-70E740481C1C}">
@@ -13256,13 +13256,15 @@
               </a:ext>
             </a:extLst>
           </a:blip>
-          <a:srcRect t="5602"/>
-          <a:stretch/>
+          <a:srcRect/>
+          <a:stretch>
+            <a:fillRect/>
+          </a:stretch>
         </p:blipFill>
         <p:spPr bwMode="auto">
           <a:xfrm>
-            <a:off x="343242" y="2107688"/>
-            <a:ext cx="8233834" cy="4323547"/>
+            <a:off x="232229" y="2138116"/>
+            <a:ext cx="8038468" cy="4471398"/>
           </a:xfrm>
           <a:prstGeom prst="rect">
             <a:avLst/>
@@ -16461,7 +16463,7 @@
           <a:p>
             <a:r>
               <a:rPr lang="en-US" sz="3500" dirty="0"/>
-              <a:t>Prepare for Modeling</a:t>
+              <a:t>Preparing for Modeling</a:t>
             </a:r>
           </a:p>
         </p:txBody>
@@ -16561,12 +16563,6 @@
             <a:normAutofit/>
           </a:bodyPr>
           <a:lstStyle/>
-          <a:p>
-            <a:r>
-              <a:rPr lang="en-US" sz="2400" dirty="0"/>
-              <a:t>Import the training data</a:t>
-            </a:r>
-          </a:p>
           <a:p>
             <a:r>
               <a:rPr lang="en-US" sz="2400" dirty="0"/>
@@ -17507,7 +17503,7 @@
             <p:ph idx="1"/>
             <p:extLst>
               <p:ext uri="{D42A27DB-BD31-4B8C-83A1-F6EECF244321}">
-                <p14:modId xmlns:p14="http://schemas.microsoft.com/office/powerpoint/2010/main" val="187196009"/>
+                <p14:modId xmlns:p14="http://schemas.microsoft.com/office/powerpoint/2010/main" val="4293731533"/>
               </p:ext>
             </p:extLst>
           </p:nvPr>
@@ -17550,7 +17546,7 @@
         </p:blipFill>
         <p:spPr>
           <a:xfrm>
-            <a:off x="6433930" y="5262563"/>
+            <a:off x="2454358" y="5145882"/>
             <a:ext cx="914400" cy="914400"/>
           </a:xfrm>
           <a:prstGeom prst="rect">

</xml_diff>

<commit_message>
hope this will be the final
</commit_message>
<xml_diff>
--- a/DirectMarket.pptx
+++ b/DirectMarket.pptx
@@ -18,6 +18,7 @@
     <p:sldId id="267" r:id="rId12"/>
     <p:sldId id="268" r:id="rId13"/>
     <p:sldId id="270" r:id="rId14"/>
+    <p:sldId id="271" r:id="rId15"/>
   </p:sldIdLst>
   <p:sldSz cx="9144000" cy="6858000" type="screen4x3"/>
   <p:notesSz cx="6858000" cy="9144000"/>
@@ -2413,7 +2414,7 @@
             <a:rPr lang="en-US" dirty="0">
               <a:latin typeface="Adobe Caslon Pro" panose="0205050205050A020403" pitchFamily="18" charset="77"/>
             </a:rPr>
-            <a:t> value = 0.830 after </a:t>
+            <a:t> value = 0.759 after </a:t>
           </a:r>
           <a:r>
             <a:rPr lang="en-US" dirty="0" err="1">
@@ -2487,7 +2488,7 @@
             <a:rPr lang="en-US" dirty="0">
               <a:latin typeface="Adobe Caslon Pro" panose="0205050205050A020403" pitchFamily="18" charset="77"/>
             </a:rPr>
-            <a:t> value = 0.926 after </a:t>
+            <a:t> value = 0.931 after </a:t>
           </a:r>
           <a:r>
             <a:rPr lang="en-US" dirty="0" err="1">
@@ -2900,7 +2901,7 @@
             <a:rPr lang="en-US" dirty="0">
               <a:latin typeface="Adobe Caslon Pro" panose="0205050205050A020403" pitchFamily="18" charset="77"/>
             </a:rPr>
-            <a:t>Fit the Model with Tuned Hyperparameters</a:t>
+            <a:t>Fit the Training-Split with Tuned Hyperparameters</a:t>
           </a:r>
         </a:p>
       </dgm:t>
@@ -3259,7 +3260,7 @@
             <a:rPr lang="en-US" sz="2300" kern="1200" dirty="0">
               <a:latin typeface="Adobe Caslon Pro" panose="0205050205050A020403" pitchFamily="18" charset="77"/>
             </a:rPr>
-            <a:t> value = 0.830 after </a:t>
+            <a:t> value = 0.759 after </a:t>
           </a:r>
           <a:r>
             <a:rPr lang="en-US" sz="2300" kern="1200" dirty="0" err="1">
@@ -3434,7 +3435,7 @@
             <a:rPr lang="en-US" sz="2300" kern="1200" dirty="0">
               <a:latin typeface="Adobe Caslon Pro" panose="0205050205050A020403" pitchFamily="18" charset="77"/>
             </a:rPr>
-            <a:t> value = 0.926 after </a:t>
+            <a:t> value = 0.931 after </a:t>
           </a:r>
           <a:r>
             <a:rPr lang="en-US" sz="2300" kern="1200" dirty="0" err="1">
@@ -3858,12 +3859,12 @@
         </a:fontRef>
       </dsp:style>
       <dsp:txBody>
-        <a:bodyPr spcFirstLastPara="0" vert="horz" wrap="square" lIns="177800" tIns="177800" rIns="177800" bIns="177800" numCol="1" spcCol="1270" anchor="ctr" anchorCtr="0">
+        <a:bodyPr spcFirstLastPara="0" vert="horz" wrap="square" lIns="170688" tIns="170688" rIns="170688" bIns="170688" numCol="1" spcCol="1270" anchor="ctr" anchorCtr="0">
           <a:noAutofit/>
         </a:bodyPr>
         <a:lstStyle/>
         <a:p>
-          <a:pPr marL="0" lvl="0" indent="0" algn="ctr" defTabSz="1111250">
+          <a:pPr marL="0" lvl="0" indent="0" algn="ctr" defTabSz="1066800">
             <a:lnSpc>
               <a:spcPct val="90000"/>
             </a:lnSpc>
@@ -3876,7 +3877,7 @@
             <a:buNone/>
           </a:pPr>
           <a:r>
-            <a:rPr lang="en-US" sz="2500" kern="1200" dirty="0">
+            <a:rPr lang="en-US" sz="2400" kern="1200" dirty="0">
               <a:latin typeface="Adobe Caslon Pro" panose="0205050205050A020403" pitchFamily="18" charset="77"/>
             </a:rPr>
             <a:t>Evaluate Model with Metrics</a:t>
@@ -3938,12 +3939,12 @@
         </a:fontRef>
       </dsp:style>
       <dsp:txBody>
-        <a:bodyPr spcFirstLastPara="0" vert="horz" wrap="square" lIns="177800" tIns="177800" rIns="177800" bIns="177800" numCol="1" spcCol="1270" anchor="ctr" anchorCtr="0">
+        <a:bodyPr spcFirstLastPara="0" vert="horz" wrap="square" lIns="170688" tIns="170688" rIns="170688" bIns="170688" numCol="1" spcCol="1270" anchor="ctr" anchorCtr="0">
           <a:noAutofit/>
         </a:bodyPr>
         <a:lstStyle/>
         <a:p>
-          <a:pPr marL="0" lvl="0" indent="0" algn="ctr" defTabSz="1111250">
+          <a:pPr marL="0" lvl="0" indent="0" algn="ctr" defTabSz="1066800">
             <a:lnSpc>
               <a:spcPct val="90000"/>
             </a:lnSpc>
@@ -3956,18 +3957,18 @@
             <a:buNone/>
           </a:pPr>
           <a:r>
-            <a:rPr lang="en-US" sz="2500" kern="1200" dirty="0">
+            <a:rPr lang="en-US" sz="2400" kern="1200" dirty="0">
               <a:latin typeface="Adobe Caslon Pro" panose="0205050205050A020403" pitchFamily="18" charset="77"/>
             </a:rPr>
             <a:t>Get Predict Values using </a:t>
           </a:r>
           <a:r>
-            <a:rPr lang="en-US" sz="2500" kern="1200" dirty="0" err="1">
+            <a:rPr lang="en-US" sz="2400" kern="1200" dirty="0" err="1">
               <a:latin typeface="Adobe Caslon Pro" panose="0205050205050A020403" pitchFamily="18" charset="77"/>
             </a:rPr>
             <a:t>X_test</a:t>
           </a:r>
-          <a:endParaRPr lang="en-US" sz="2500" kern="1200" dirty="0">
+          <a:endParaRPr lang="en-US" sz="2400" kern="1200" dirty="0">
             <a:latin typeface="Adobe Caslon Pro" panose="0205050205050A020403" pitchFamily="18" charset="77"/>
           </a:endParaRPr>
         </a:p>
@@ -4027,12 +4028,12 @@
         </a:fontRef>
       </dsp:style>
       <dsp:txBody>
-        <a:bodyPr spcFirstLastPara="0" vert="horz" wrap="square" lIns="177800" tIns="177800" rIns="177800" bIns="177800" numCol="1" spcCol="1270" anchor="ctr" anchorCtr="0">
+        <a:bodyPr spcFirstLastPara="0" vert="horz" wrap="square" lIns="170688" tIns="170688" rIns="170688" bIns="170688" numCol="1" spcCol="1270" anchor="ctr" anchorCtr="0">
           <a:noAutofit/>
         </a:bodyPr>
         <a:lstStyle/>
         <a:p>
-          <a:pPr marL="0" lvl="0" indent="0" algn="ctr" defTabSz="1111250">
+          <a:pPr marL="0" lvl="0" indent="0" algn="ctr" defTabSz="1066800">
             <a:lnSpc>
               <a:spcPct val="90000"/>
             </a:lnSpc>
@@ -4045,10 +4046,10 @@
             <a:buNone/>
           </a:pPr>
           <a:r>
-            <a:rPr lang="en-US" sz="2500" kern="1200" dirty="0">
+            <a:rPr lang="en-US" sz="2400" kern="1200" dirty="0">
               <a:latin typeface="Adobe Caslon Pro" panose="0205050205050A020403" pitchFamily="18" charset="77"/>
             </a:rPr>
-            <a:t>Fit the Model with Tuned Hyperparameters</a:t>
+            <a:t>Fit the Training-Split with Tuned Hyperparameters</a:t>
           </a:r>
         </a:p>
       </dsp:txBody>
@@ -12394,7 +12395,7 @@
           <p:nvPr>
             <p:extLst>
               <p:ext uri="{D42A27DB-BD31-4B8C-83A1-F6EECF244321}">
-                <p14:modId xmlns:p14="http://schemas.microsoft.com/office/powerpoint/2010/main" val="2472808118"/>
+                <p14:modId xmlns:p14="http://schemas.microsoft.com/office/powerpoint/2010/main" val="272846460"/>
               </p:ext>
             </p:extLst>
           </p:nvPr>
@@ -13722,6 +13723,448 @@
     <p:extLst>
       <p:ext uri="{BB962C8B-B14F-4D97-AF65-F5344CB8AC3E}">
         <p14:creationId xmlns:p14="http://schemas.microsoft.com/office/powerpoint/2010/main" val="1055016681"/>
+      </p:ext>
+    </p:extLst>
+  </p:cSld>
+  <p:clrMapOvr>
+    <a:masterClrMapping/>
+  </p:clrMapOvr>
+</p:sld>
+</file>
+
+<file path=ppt/slides/slide14.xml><?xml version="1.0" encoding="utf-8"?>
+<p:sld xmlns:a="http://schemas.openxmlformats.org/drawingml/2006/main" xmlns:r="http://schemas.openxmlformats.org/officeDocument/2006/relationships" xmlns:p="http://schemas.openxmlformats.org/presentationml/2006/main">
+  <p:cSld>
+    <p:bg>
+      <p:bgPr>
+        <a:solidFill>
+          <a:schemeClr val="bg1"/>
+        </a:solidFill>
+        <a:effectLst/>
+      </p:bgPr>
+    </p:bg>
+    <p:spTree>
+      <p:nvGrpSpPr>
+        <p:cNvPr id="1" name=""/>
+        <p:cNvGrpSpPr/>
+        <p:nvPr/>
+      </p:nvGrpSpPr>
+      <p:grpSpPr>
+        <a:xfrm>
+          <a:off x="0" y="0"/>
+          <a:ext cx="0" cy="0"/>
+          <a:chOff x="0" y="0"/>
+          <a:chExt cx="0" cy="0"/>
+        </a:xfrm>
+      </p:grpSpPr>
+      <p:sp useBgFill="1">
+        <p:nvSpPr>
+          <p:cNvPr id="8" name="Rectangle 7">
+            <a:extLst>
+              <a:ext uri="{FF2B5EF4-FFF2-40B4-BE49-F238E27FC236}">
+                <a16:creationId xmlns:a16="http://schemas.microsoft.com/office/drawing/2014/main" id="{DAF1966E-FD40-4A4A-B61B-C4DF7FA05F06}"/>
+              </a:ext>
+              <a:ext uri="{C183D7F6-B498-43B3-948B-1728B52AA6E4}">
+                <adec:decorative xmlns:adec="http://schemas.microsoft.com/office/drawing/2017/decorative" val="1"/>
+              </a:ext>
+            </a:extLst>
+          </p:cNvPr>
+          <p:cNvSpPr>
+            <a:spLocks noGrp="1" noRot="1" noChangeAspect="1" noMove="1" noResize="1" noEditPoints="1" noAdjustHandles="1" noChangeArrowheads="1" noChangeShapeType="1" noTextEdit="1"/>
+          </p:cNvSpPr>
+          <p:nvPr>
+            <p:extLst>
+              <p:ext uri="{386F3935-93C4-4BCD-93E2-E3B085C9AB24}">
+                <p16:designElem xmlns:p16="http://schemas.microsoft.com/office/powerpoint/2015/main" val="1"/>
+              </p:ext>
+            </p:extLst>
+          </p:nvPr>
+        </p:nvSpPr>
+        <p:spPr>
+          <a:xfrm>
+            <a:off x="0" y="0"/>
+            <a:ext cx="9144000" cy="6858000"/>
+          </a:xfrm>
+          <a:prstGeom prst="rect">
+            <a:avLst/>
+          </a:prstGeom>
+          <a:ln>
+            <a:noFill/>
+          </a:ln>
+        </p:spPr>
+        <p:style>
+          <a:lnRef idx="2">
+            <a:schemeClr val="accent1">
+              <a:shade val="50000"/>
+            </a:schemeClr>
+          </a:lnRef>
+          <a:fillRef idx="1">
+            <a:schemeClr val="accent1"/>
+          </a:fillRef>
+          <a:effectRef idx="0">
+            <a:schemeClr val="accent1"/>
+          </a:effectRef>
+          <a:fontRef idx="minor">
+            <a:schemeClr val="lt1"/>
+          </a:fontRef>
+        </p:style>
+        <p:txBody>
+          <a:bodyPr rtlCol="0" anchor="ctr"/>
+          <a:lstStyle/>
+          <a:p>
+            <a:pPr algn="ctr"/>
+            <a:endParaRPr lang="en-US"/>
+          </a:p>
+        </p:txBody>
+      </p:sp>
+      <p:sp useBgFill="1">
+        <p:nvSpPr>
+          <p:cNvPr id="10" name="Rectangle 9">
+            <a:extLst>
+              <a:ext uri="{FF2B5EF4-FFF2-40B4-BE49-F238E27FC236}">
+                <a16:creationId xmlns:a16="http://schemas.microsoft.com/office/drawing/2014/main" id="{047BFA19-D45E-416B-A404-7AF2F3F27017}"/>
+              </a:ext>
+              <a:ext uri="{C183D7F6-B498-43B3-948B-1728B52AA6E4}">
+                <adec:decorative xmlns:adec="http://schemas.microsoft.com/office/drawing/2017/decorative" val="1"/>
+              </a:ext>
+            </a:extLst>
+          </p:cNvPr>
+          <p:cNvSpPr>
+            <a:spLocks noGrp="1" noRot="1" noChangeAspect="1" noMove="1" noResize="1" noEditPoints="1" noAdjustHandles="1" noChangeArrowheads="1" noChangeShapeType="1" noTextEdit="1"/>
+          </p:cNvSpPr>
+          <p:nvPr>
+            <p:extLst>
+              <p:ext uri="{386F3935-93C4-4BCD-93E2-E3B085C9AB24}">
+                <p16:designElem xmlns:p16="http://schemas.microsoft.com/office/powerpoint/2015/main" val="1"/>
+              </p:ext>
+            </p:extLst>
+          </p:nvPr>
+        </p:nvSpPr>
+        <p:spPr>
+          <a:xfrm>
+            <a:off x="418656" y="0"/>
+            <a:ext cx="8375586" cy="2018806"/>
+          </a:xfrm>
+          <a:prstGeom prst="rect">
+            <a:avLst/>
+          </a:prstGeom>
+          <a:ln w="9525">
+            <a:solidFill>
+              <a:srgbClr val="E1E1E1"/>
+            </a:solidFill>
+          </a:ln>
+          <a:effectLst>
+            <a:outerShdw blurRad="50800" dist="38100" dir="2700000" algn="tl" rotWithShape="0">
+              <a:schemeClr val="bg1">
+                <a:lumMod val="85000"/>
+                <a:alpha val="50000"/>
+              </a:schemeClr>
+            </a:outerShdw>
+          </a:effectLst>
+        </p:spPr>
+        <p:style>
+          <a:lnRef idx="2">
+            <a:schemeClr val="accent1">
+              <a:shade val="50000"/>
+            </a:schemeClr>
+          </a:lnRef>
+          <a:fillRef idx="1">
+            <a:schemeClr val="accent1"/>
+          </a:fillRef>
+          <a:effectRef idx="0">
+            <a:schemeClr val="accent1"/>
+          </a:effectRef>
+          <a:fontRef idx="minor">
+            <a:schemeClr val="lt1"/>
+          </a:fontRef>
+        </p:style>
+        <p:txBody>
+          <a:bodyPr rtlCol="0" anchor="ctr"/>
+          <a:lstStyle/>
+          <a:p>
+            <a:pPr marL="0" marR="0" lvl="0" indent="0" algn="ctr" defTabSz="914400" rtl="0" eaLnBrk="1" fontAlgn="auto" latinLnBrk="0" hangingPunct="1">
+              <a:lnSpc>
+                <a:spcPct val="100000"/>
+              </a:lnSpc>
+              <a:spcBef>
+                <a:spcPts val="0"/>
+              </a:spcBef>
+              <a:spcAft>
+                <a:spcPts val="0"/>
+              </a:spcAft>
+              <a:buClrTx/>
+              <a:buSzTx/>
+              <a:buFontTx/>
+              <a:buNone/>
+              <a:tabLst/>
+              <a:defRPr/>
+            </a:pPr>
+            <a:endParaRPr kumimoji="0" lang="en-US" sz="1800" b="0" i="0" u="none" strike="noStrike" kern="1200" cap="none" spc="0" normalizeH="0" baseline="0" noProof="0">
+              <a:ln>
+                <a:noFill/>
+              </a:ln>
+              <a:solidFill>
+                <a:prstClr val="white"/>
+              </a:solidFill>
+              <a:effectLst/>
+              <a:uLnTx/>
+              <a:uFillTx/>
+              <a:latin typeface="Calibri" panose="020F0502020204030204"/>
+              <a:ea typeface="+mn-ea"/>
+              <a:cs typeface="+mn-cs"/>
+            </a:endParaRPr>
+          </a:p>
+        </p:txBody>
+      </p:sp>
+      <p:sp useBgFill="1">
+        <p:nvSpPr>
+          <p:cNvPr id="12" name="Rectangle 11">
+            <a:extLst>
+              <a:ext uri="{FF2B5EF4-FFF2-40B4-BE49-F238E27FC236}">
+                <a16:creationId xmlns:a16="http://schemas.microsoft.com/office/drawing/2014/main" id="{8E0105E7-23DB-4CF2-8258-FF47C7620F6E}"/>
+              </a:ext>
+              <a:ext uri="{C183D7F6-B498-43B3-948B-1728B52AA6E4}">
+                <adec:decorative xmlns:adec="http://schemas.microsoft.com/office/drawing/2017/decorative" val="1"/>
+              </a:ext>
+            </a:extLst>
+          </p:cNvPr>
+          <p:cNvSpPr>
+            <a:spLocks noGrp="1" noRot="1" noChangeAspect="1" noMove="1" noResize="1" noEditPoints="1" noAdjustHandles="1" noChangeArrowheads="1" noChangeShapeType="1" noTextEdit="1"/>
+          </p:cNvSpPr>
+          <p:nvPr>
+            <p:extLst>
+              <p:ext uri="{386F3935-93C4-4BCD-93E2-E3B085C9AB24}">
+                <p16:designElem xmlns:p16="http://schemas.microsoft.com/office/powerpoint/2015/main" val="1"/>
+              </p:ext>
+            </p:extLst>
+          </p:nvPr>
+        </p:nvSpPr>
+        <p:spPr>
+          <a:xfrm>
+            <a:off x="425196" y="0"/>
+            <a:ext cx="8366760" cy="2011680"/>
+          </a:xfrm>
+          <a:prstGeom prst="rect">
+            <a:avLst/>
+          </a:prstGeom>
+          <a:ln w="9525">
+            <a:noFill/>
+          </a:ln>
+          <a:effectLst/>
+        </p:spPr>
+        <p:style>
+          <a:lnRef idx="2">
+            <a:schemeClr val="accent1">
+              <a:shade val="50000"/>
+            </a:schemeClr>
+          </a:lnRef>
+          <a:fillRef idx="1">
+            <a:schemeClr val="accent1"/>
+          </a:fillRef>
+          <a:effectRef idx="0">
+            <a:schemeClr val="accent1"/>
+          </a:effectRef>
+          <a:fontRef idx="minor">
+            <a:schemeClr val="lt1"/>
+          </a:fontRef>
+        </p:style>
+        <p:txBody>
+          <a:bodyPr rtlCol="0" anchor="ctr"/>
+          <a:lstStyle/>
+          <a:p>
+            <a:pPr marL="0" marR="0" lvl="0" indent="0" algn="ctr" defTabSz="914400" rtl="0" eaLnBrk="1" fontAlgn="auto" latinLnBrk="0" hangingPunct="1">
+              <a:lnSpc>
+                <a:spcPct val="100000"/>
+              </a:lnSpc>
+              <a:spcBef>
+                <a:spcPts val="0"/>
+              </a:spcBef>
+              <a:spcAft>
+                <a:spcPts val="0"/>
+              </a:spcAft>
+              <a:buClrTx/>
+              <a:buSzTx/>
+              <a:buFontTx/>
+              <a:buNone/>
+              <a:tabLst/>
+              <a:defRPr/>
+            </a:pPr>
+            <a:endParaRPr kumimoji="0" lang="en-US" sz="1800" b="0" i="0" u="none" strike="noStrike" kern="1200" cap="none" spc="0" normalizeH="0" baseline="0" noProof="0">
+              <a:ln>
+                <a:noFill/>
+              </a:ln>
+              <a:solidFill>
+                <a:prstClr val="white"/>
+              </a:solidFill>
+              <a:effectLst/>
+              <a:uLnTx/>
+              <a:uFillTx/>
+              <a:latin typeface="Calibri" panose="020F0502020204030204"/>
+              <a:ea typeface="+mn-ea"/>
+              <a:cs typeface="+mn-cs"/>
+            </a:endParaRPr>
+          </a:p>
+        </p:txBody>
+      </p:sp>
+      <p:sp>
+        <p:nvSpPr>
+          <p:cNvPr id="2" name="Title 1">
+            <a:extLst>
+              <a:ext uri="{FF2B5EF4-FFF2-40B4-BE49-F238E27FC236}">
+                <a16:creationId xmlns:a16="http://schemas.microsoft.com/office/drawing/2014/main" id="{9421CC81-A078-194D-B08F-F2F7FADEA43B}"/>
+              </a:ext>
+            </a:extLst>
+          </p:cNvPr>
+          <p:cNvSpPr>
+            <a:spLocks noGrp="1"/>
+          </p:cNvSpPr>
+          <p:nvPr>
+            <p:ph type="title"/>
+          </p:nvPr>
+        </p:nvSpPr>
+        <p:spPr>
+          <a:xfrm>
+            <a:off x="836676" y="548640"/>
+            <a:ext cx="7626096" cy="1179576"/>
+          </a:xfrm>
+        </p:spPr>
+        <p:txBody>
+          <a:bodyPr>
+            <a:normAutofit/>
+          </a:bodyPr>
+          <a:lstStyle/>
+          <a:p>
+            <a:r>
+              <a:rPr lang="en-US" sz="3600" dirty="0"/>
+              <a:t>Future Use of The Modeling</a:t>
+            </a:r>
+          </a:p>
+        </p:txBody>
+      </p:sp>
+      <p:sp>
+        <p:nvSpPr>
+          <p:cNvPr id="14" name="Rectangle 13">
+            <a:extLst>
+              <a:ext uri="{FF2B5EF4-FFF2-40B4-BE49-F238E27FC236}">
+                <a16:creationId xmlns:a16="http://schemas.microsoft.com/office/drawing/2014/main" id="{074B4F7D-14B2-478B-8BF5-01E4E0C5D263}"/>
+              </a:ext>
+              <a:ext uri="{C183D7F6-B498-43B3-948B-1728B52AA6E4}">
+                <adec:decorative xmlns:adec="http://schemas.microsoft.com/office/drawing/2017/decorative" val="1"/>
+              </a:ext>
+            </a:extLst>
+          </p:cNvPr>
+          <p:cNvSpPr>
+            <a:spLocks noGrp="1" noRot="1" noChangeAspect="1" noMove="1" noResize="1" noEditPoints="1" noAdjustHandles="1" noChangeArrowheads="1" noChangeShapeType="1" noTextEdit="1"/>
+          </p:cNvSpPr>
+          <p:nvPr>
+            <p:extLst>
+              <p:ext uri="{386F3935-93C4-4BCD-93E2-E3B085C9AB24}">
+                <p16:designElem xmlns:p16="http://schemas.microsoft.com/office/powerpoint/2015/main" val="1"/>
+              </p:ext>
+            </p:extLst>
+          </p:nvPr>
+        </p:nvSpPr>
+        <p:spPr>
+          <a:xfrm>
+            <a:off x="374125" y="758952"/>
+            <a:ext cx="96012" cy="704088"/>
+          </a:xfrm>
+          <a:prstGeom prst="rect">
+            <a:avLst/>
+          </a:prstGeom>
+          <a:solidFill>
+            <a:schemeClr val="accent2"/>
+          </a:solidFill>
+          <a:ln>
+            <a:noFill/>
+          </a:ln>
+        </p:spPr>
+        <p:style>
+          <a:lnRef idx="2">
+            <a:schemeClr val="accent1">
+              <a:shade val="50000"/>
+            </a:schemeClr>
+          </a:lnRef>
+          <a:fillRef idx="1">
+            <a:schemeClr val="accent1"/>
+          </a:fillRef>
+          <a:effectRef idx="0">
+            <a:schemeClr val="accent1"/>
+          </a:effectRef>
+          <a:fontRef idx="minor">
+            <a:schemeClr val="lt1"/>
+          </a:fontRef>
+        </p:style>
+        <p:txBody>
+          <a:bodyPr rtlCol="0" anchor="ctr"/>
+          <a:lstStyle/>
+          <a:p>
+            <a:pPr algn="ctr"/>
+            <a:endParaRPr lang="en-US">
+              <a:solidFill>
+                <a:prstClr val="white"/>
+              </a:solidFill>
+              <a:latin typeface="Calibri" panose="020F0502020204030204"/>
+            </a:endParaRPr>
+          </a:p>
+        </p:txBody>
+      </p:sp>
+      <p:sp>
+        <p:nvSpPr>
+          <p:cNvPr id="9" name="Content Placeholder 2">
+            <a:extLst>
+              <a:ext uri="{FF2B5EF4-FFF2-40B4-BE49-F238E27FC236}">
+                <a16:creationId xmlns:a16="http://schemas.microsoft.com/office/drawing/2014/main" id="{D3CFD2B6-C09D-1B4D-A76F-A336A1C47DD9}"/>
+              </a:ext>
+            </a:extLst>
+          </p:cNvPr>
+          <p:cNvSpPr>
+            <a:spLocks noGrp="1"/>
+          </p:cNvSpPr>
+          <p:nvPr>
+            <p:ph idx="1"/>
+          </p:nvPr>
+        </p:nvSpPr>
+        <p:spPr>
+          <a:xfrm>
+            <a:off x="836676" y="2481943"/>
+            <a:ext cx="7626096" cy="3695020"/>
+          </a:xfrm>
+        </p:spPr>
+        <p:txBody>
+          <a:bodyPr>
+            <a:normAutofit/>
+          </a:bodyPr>
+          <a:lstStyle/>
+          <a:p>
+            <a:r>
+              <a:rPr lang="en-US" sz="2400" dirty="0"/>
+              <a:t>Change contact strategies: choose costumers that are more likely to subscribe.</a:t>
+            </a:r>
+          </a:p>
+          <a:p>
+            <a:endParaRPr lang="en-US" sz="2400" dirty="0"/>
+          </a:p>
+          <a:p>
+            <a:endParaRPr lang="en-US" sz="2400" dirty="0"/>
+          </a:p>
+          <a:p>
+            <a:r>
+              <a:rPr lang="en-US" sz="2400" dirty="0"/>
+              <a:t>Question: Features are </a:t>
+            </a:r>
+            <a:r>
+              <a:rPr lang="en-US" sz="2400"/>
+              <a:t>all important as a ‘No’?</a:t>
+            </a:r>
+            <a:endParaRPr lang="en-US" sz="2400" dirty="0"/>
+          </a:p>
+        </p:txBody>
+      </p:sp>
+    </p:spTree>
+    <p:extLst>
+      <p:ext uri="{BB962C8B-B14F-4D97-AF65-F5344CB8AC3E}">
+        <p14:creationId xmlns:p14="http://schemas.microsoft.com/office/powerpoint/2010/main" val="2062109086"/>
       </p:ext>
     </p:extLst>
   </p:cSld>
@@ -15283,6 +15726,108 @@
   <p:clrMapOvr>
     <a:masterClrMapping/>
   </p:clrMapOvr>
+  <p:timing>
+    <p:tnLst>
+      <p:par>
+        <p:cTn id="1" dur="indefinite" restart="never" nodeType="tmRoot">
+          <p:childTnLst>
+            <p:seq concurrent="1" nextAc="seek">
+              <p:cTn id="2" dur="indefinite" nodeType="mainSeq">
+                <p:childTnLst>
+                  <p:par>
+                    <p:cTn id="3" fill="hold">
+                      <p:stCondLst>
+                        <p:cond delay="indefinite"/>
+                      </p:stCondLst>
+                      <p:childTnLst>
+                        <p:par>
+                          <p:cTn id="4" fill="hold">
+                            <p:stCondLst>
+                              <p:cond delay="0"/>
+                            </p:stCondLst>
+                            <p:childTnLst>
+                              <p:par>
+                                <p:cTn id="5" presetID="1" presetClass="entr" presetSubtype="0" fill="hold" nodeType="clickEffect">
+                                  <p:stCondLst>
+                                    <p:cond delay="0"/>
+                                  </p:stCondLst>
+                                  <p:childTnLst>
+                                    <p:set>
+                                      <p:cBhvr>
+                                        <p:cTn id="6" dur="1" fill="hold">
+                                          <p:stCondLst>
+                                            <p:cond delay="0"/>
+                                          </p:stCondLst>
+                                        </p:cTn>
+                                        <p:tgtEl>
+                                          <p:spTgt spid="9"/>
+                                        </p:tgtEl>
+                                        <p:attrNameLst>
+                                          <p:attrName>style.visibility</p:attrName>
+                                        </p:attrNameLst>
+                                      </p:cBhvr>
+                                      <p:to>
+                                        <p:strVal val="visible"/>
+                                      </p:to>
+                                    </p:set>
+                                  </p:childTnLst>
+                                </p:cTn>
+                              </p:par>
+                              <p:par>
+                                <p:cTn id="7" presetID="1" presetClass="entr" presetSubtype="0" fill="hold" nodeType="withEffect">
+                                  <p:stCondLst>
+                                    <p:cond delay="0"/>
+                                  </p:stCondLst>
+                                  <p:childTnLst>
+                                    <p:set>
+                                      <p:cBhvr>
+                                        <p:cTn id="8" dur="1" fill="hold">
+                                          <p:stCondLst>
+                                            <p:cond delay="0"/>
+                                          </p:stCondLst>
+                                        </p:cTn>
+                                        <p:tgtEl>
+                                          <p:spTgt spid="11"/>
+                                        </p:tgtEl>
+                                        <p:attrNameLst>
+                                          <p:attrName>style.visibility</p:attrName>
+                                        </p:attrNameLst>
+                                      </p:cBhvr>
+                                      <p:to>
+                                        <p:strVal val="visible"/>
+                                      </p:to>
+                                    </p:set>
+                                  </p:childTnLst>
+                                </p:cTn>
+                              </p:par>
+                            </p:childTnLst>
+                          </p:cTn>
+                        </p:par>
+                      </p:childTnLst>
+                    </p:cTn>
+                  </p:par>
+                </p:childTnLst>
+              </p:cTn>
+              <p:prevCondLst>
+                <p:cond evt="onPrev" delay="0">
+                  <p:tgtEl>
+                    <p:sldTgt/>
+                  </p:tgtEl>
+                </p:cond>
+              </p:prevCondLst>
+              <p:nextCondLst>
+                <p:cond evt="onNext" delay="0">
+                  <p:tgtEl>
+                    <p:sldTgt/>
+                  </p:tgtEl>
+                </p:cond>
+              </p:nextCondLst>
+            </p:seq>
+          </p:childTnLst>
+        </p:cTn>
+      </p:par>
+    </p:tnLst>
+  </p:timing>
 </p:sld>
 </file>
 
@@ -17022,7 +17567,7 @@
             <p:ph idx="1"/>
             <p:extLst>
               <p:ext uri="{D42A27DB-BD31-4B8C-83A1-F6EECF244321}">
-                <p14:modId xmlns:p14="http://schemas.microsoft.com/office/powerpoint/2010/main" val="3368598285"/>
+                <p14:modId xmlns:p14="http://schemas.microsoft.com/office/powerpoint/2010/main" val="3298089631"/>
               </p:ext>
             </p:extLst>
           </p:nvPr>

</xml_diff>

<commit_message>
added classification report to pptx
</commit_message>
<xml_diff>
--- a/DirectMarket.pptx
+++ b/DirectMarket.pptx
@@ -15,10 +15,11 @@
     <p:sldId id="263" r:id="rId9"/>
     <p:sldId id="265" r:id="rId10"/>
     <p:sldId id="266" r:id="rId11"/>
-    <p:sldId id="267" r:id="rId12"/>
-    <p:sldId id="268" r:id="rId13"/>
-    <p:sldId id="270" r:id="rId14"/>
-    <p:sldId id="271" r:id="rId15"/>
+    <p:sldId id="272" r:id="rId12"/>
+    <p:sldId id="267" r:id="rId13"/>
+    <p:sldId id="268" r:id="rId14"/>
+    <p:sldId id="270" r:id="rId15"/>
+    <p:sldId id="271" r:id="rId16"/>
   </p:sldIdLst>
   <p:sldSz cx="9144000" cy="6858000" type="screen4x3"/>
   <p:notesSz cx="6858000" cy="9144000"/>
@@ -2389,11 +2390,17 @@
         <a:p>
           <a:r>
             <a:rPr lang="en-US" dirty="0" err="1">
+              <a:solidFill>
+                <a:srgbClr val="FF0000"/>
+              </a:solidFill>
               <a:latin typeface="Adobe Caslon Pro" panose="0205050205050A020403" pitchFamily="18" charset="77"/>
             </a:rPr>
             <a:t>LogisticRegression</a:t>
           </a:r>
           <a:endParaRPr lang="en-US" dirty="0">
+            <a:solidFill>
+              <a:srgbClr val="FF0000"/>
+            </a:solidFill>
             <a:latin typeface="Adobe Caslon Pro" panose="0205050205050A020403" pitchFamily="18" charset="77"/>
           </a:endParaRPr>
         </a:p>
@@ -2463,11 +2470,17 @@
         <a:p>
           <a:r>
             <a:rPr lang="en-US" dirty="0" err="1">
+              <a:solidFill>
+                <a:srgbClr val="FF0000"/>
+              </a:solidFill>
               <a:latin typeface="Adobe Caslon Pro" panose="0205050205050A020403" pitchFamily="18" charset="77"/>
             </a:rPr>
             <a:t>RandomForestClassifier</a:t>
           </a:r>
           <a:endParaRPr lang="en-US" dirty="0">
+            <a:solidFill>
+              <a:srgbClr val="FF0000"/>
+            </a:solidFill>
             <a:latin typeface="Adobe Caslon Pro" panose="0205050205050A020403" pitchFamily="18" charset="77"/>
           </a:endParaRPr>
         </a:p>
@@ -2653,6 +2666,9 @@
         <a:p>
           <a:r>
             <a:rPr lang="en-US" dirty="0" err="1">
+              <a:solidFill>
+                <a:srgbClr val="FF0000"/>
+              </a:solidFill>
               <a:latin typeface="Adobe Caslon Pro" panose="0205050205050A020403" pitchFamily="18" charset="77"/>
             </a:rPr>
             <a:t>GridSearchCV</a:t>
@@ -2721,6 +2737,9 @@
         <a:p>
           <a:r>
             <a:rPr lang="en-US" dirty="0" err="1">
+              <a:solidFill>
+                <a:srgbClr val="FF0000"/>
+              </a:solidFill>
               <a:latin typeface="Adobe Caslon Pro" panose="0205050205050A020403" pitchFamily="18" charset="77"/>
             </a:rPr>
             <a:t>RandomSearchCV</a:t>
@@ -3223,11 +3242,17 @@
           </a:pPr>
           <a:r>
             <a:rPr lang="en-US" sz="2300" kern="1200" dirty="0" err="1">
+              <a:solidFill>
+                <a:srgbClr val="FF0000"/>
+              </a:solidFill>
               <a:latin typeface="Adobe Caslon Pro" panose="0205050205050A020403" pitchFamily="18" charset="77"/>
             </a:rPr>
             <a:t>LogisticRegression</a:t>
           </a:r>
           <a:endParaRPr lang="en-US" sz="2300" kern="1200" dirty="0">
+            <a:solidFill>
+              <a:srgbClr val="FF0000"/>
+            </a:solidFill>
             <a:latin typeface="Adobe Caslon Pro" panose="0205050205050A020403" pitchFamily="18" charset="77"/>
           </a:endParaRPr>
         </a:p>
@@ -3398,11 +3423,17 @@
           </a:pPr>
           <a:r>
             <a:rPr lang="en-US" sz="2300" kern="1200" dirty="0" err="1">
+              <a:solidFill>
+                <a:srgbClr val="FF0000"/>
+              </a:solidFill>
               <a:latin typeface="Adobe Caslon Pro" panose="0205050205050A020403" pitchFamily="18" charset="77"/>
             </a:rPr>
             <a:t>RandomForestClassifier</a:t>
           </a:r>
           <a:endParaRPr lang="en-US" sz="2300" kern="1200" dirty="0">
+            <a:solidFill>
+              <a:srgbClr val="FF0000"/>
+            </a:solidFill>
             <a:latin typeface="Adobe Caslon Pro" panose="0205050205050A020403" pitchFamily="18" charset="77"/>
           </a:endParaRPr>
         </a:p>
@@ -3582,6 +3613,9 @@
           </a:pPr>
           <a:r>
             <a:rPr lang="en-US" sz="2900" kern="1200" dirty="0" err="1">
+              <a:solidFill>
+                <a:srgbClr val="FF0000"/>
+              </a:solidFill>
               <a:latin typeface="Adobe Caslon Pro" panose="0205050205050A020403" pitchFamily="18" charset="77"/>
             </a:rPr>
             <a:t>GridSearchCV</a:t>
@@ -3748,6 +3782,9 @@
           </a:pPr>
           <a:r>
             <a:rPr lang="en-US" sz="2900" kern="1200" dirty="0" err="1">
+              <a:solidFill>
+                <a:srgbClr val="FF0000"/>
+              </a:solidFill>
               <a:latin typeface="Adobe Caslon Pro" panose="0205050205050A020403" pitchFamily="18" charset="77"/>
             </a:rPr>
             <a:t>RandomSearchCV</a:t>
@@ -8774,7 +8811,7 @@
           <a:p>
             <a:fld id="{326951E3-958F-4611-B170-D081BA0250F9}" type="datetimeFigureOut">
               <a:rPr lang="en-US" smtClean="0"/>
-              <a:t>10/8/21</a:t>
+              <a:t>10/9/21</a:t>
             </a:fld>
             <a:endParaRPr lang="en-US"/>
           </a:p>
@@ -8944,7 +8981,7 @@
           <a:p>
             <a:fld id="{326951E3-958F-4611-B170-D081BA0250F9}" type="datetimeFigureOut">
               <a:rPr lang="en-US" smtClean="0"/>
-              <a:t>10/8/21</a:t>
+              <a:t>10/9/21</a:t>
             </a:fld>
             <a:endParaRPr lang="en-US"/>
           </a:p>
@@ -9124,7 +9161,7 @@
           <a:p>
             <a:fld id="{326951E3-958F-4611-B170-D081BA0250F9}" type="datetimeFigureOut">
               <a:rPr lang="en-US" smtClean="0"/>
-              <a:t>10/8/21</a:t>
+              <a:t>10/9/21</a:t>
             </a:fld>
             <a:endParaRPr lang="en-US"/>
           </a:p>
@@ -9333,7 +9370,7 @@
             <a:fld id="{326951E3-958F-4611-B170-D081BA0250F9}" type="datetimeFigureOut">
               <a:rPr lang="en-US" smtClean="0"/>
               <a:pPr/>
-              <a:t>10/8/21</a:t>
+              <a:t>10/9/21</a:t>
             </a:fld>
             <a:endParaRPr lang="en-US"/>
           </a:p>
@@ -9590,7 +9627,7 @@
           <a:p>
             <a:fld id="{326951E3-958F-4611-B170-D081BA0250F9}" type="datetimeFigureOut">
               <a:rPr lang="en-US" smtClean="0"/>
-              <a:t>10/8/21</a:t>
+              <a:t>10/9/21</a:t>
             </a:fld>
             <a:endParaRPr lang="en-US"/>
           </a:p>
@@ -9822,7 +9859,7 @@
           <a:p>
             <a:fld id="{326951E3-958F-4611-B170-D081BA0250F9}" type="datetimeFigureOut">
               <a:rPr lang="en-US" smtClean="0"/>
-              <a:t>10/8/21</a:t>
+              <a:t>10/9/21</a:t>
             </a:fld>
             <a:endParaRPr lang="en-US"/>
           </a:p>
@@ -10189,7 +10226,7 @@
           <a:p>
             <a:fld id="{326951E3-958F-4611-B170-D081BA0250F9}" type="datetimeFigureOut">
               <a:rPr lang="en-US" smtClean="0"/>
-              <a:t>10/8/21</a:t>
+              <a:t>10/9/21</a:t>
             </a:fld>
             <a:endParaRPr lang="en-US"/>
           </a:p>
@@ -10307,7 +10344,7 @@
           <a:p>
             <a:fld id="{326951E3-958F-4611-B170-D081BA0250F9}" type="datetimeFigureOut">
               <a:rPr lang="en-US" smtClean="0"/>
-              <a:t>10/8/21</a:t>
+              <a:t>10/9/21</a:t>
             </a:fld>
             <a:endParaRPr lang="en-US"/>
           </a:p>
@@ -10402,7 +10439,7 @@
           <a:p>
             <a:fld id="{326951E3-958F-4611-B170-D081BA0250F9}" type="datetimeFigureOut">
               <a:rPr lang="en-US" smtClean="0"/>
-              <a:t>10/8/21</a:t>
+              <a:t>10/9/21</a:t>
             </a:fld>
             <a:endParaRPr lang="en-US"/>
           </a:p>
@@ -10679,7 +10716,7 @@
           <a:p>
             <a:fld id="{326951E3-958F-4611-B170-D081BA0250F9}" type="datetimeFigureOut">
               <a:rPr lang="en-US" smtClean="0"/>
-              <a:t>10/8/21</a:t>
+              <a:t>10/9/21</a:t>
             </a:fld>
             <a:endParaRPr lang="en-US"/>
           </a:p>
@@ -10936,7 +10973,7 @@
           <a:p>
             <a:fld id="{326951E3-958F-4611-B170-D081BA0250F9}" type="datetimeFigureOut">
               <a:rPr lang="en-US" smtClean="0"/>
-              <a:t>10/8/21</a:t>
+              <a:t>10/9/21</a:t>
             </a:fld>
             <a:endParaRPr lang="en-US"/>
           </a:p>
@@ -11150,7 +11187,7 @@
             <a:fld id="{326951E3-958F-4611-B170-D081BA0250F9}" type="datetimeFigureOut">
               <a:rPr lang="en-US" smtClean="0"/>
               <a:pPr/>
-              <a:t>10/8/21</a:t>
+              <a:t>10/9/21</a:t>
             </a:fld>
             <a:endParaRPr lang="en-US" dirty="0"/>
           </a:p>
@@ -12310,7 +12347,10 @@
               <a:rPr lang="en-US" sz="3600" dirty="0" err="1"/>
               <a:t>RandomForestClassifier</a:t>
             </a:r>
-            <a:endParaRPr lang="en-US" sz="3600" dirty="0"/>
+            <a:r>
+              <a:rPr lang="en-US" sz="3600" dirty="0"/>
+              <a:t> Metrics</a:t>
+            </a:r>
           </a:p>
         </p:txBody>
       </p:sp>
@@ -12420,10 +12460,1164 @@
   <p:clrMapOvr>
     <a:masterClrMapping/>
   </p:clrMapOvr>
+  <p:timing>
+    <p:tnLst>
+      <p:par>
+        <p:cTn id="1" dur="indefinite" restart="never" nodeType="tmRoot">
+          <p:childTnLst>
+            <p:seq concurrent="1" nextAc="seek">
+              <p:cTn id="2" dur="indefinite" nodeType="mainSeq">
+                <p:childTnLst>
+                  <p:par>
+                    <p:cTn id="3" fill="hold">
+                      <p:stCondLst>
+                        <p:cond delay="indefinite"/>
+                      </p:stCondLst>
+                      <p:childTnLst>
+                        <p:par>
+                          <p:cTn id="4" fill="hold">
+                            <p:stCondLst>
+                              <p:cond delay="0"/>
+                            </p:stCondLst>
+                            <p:childTnLst>
+                              <p:par>
+                                <p:cTn id="5" presetID="1" presetClass="entr" presetSubtype="0" fill="hold" grpId="0" nodeType="clickEffect">
+                                  <p:stCondLst>
+                                    <p:cond delay="0"/>
+                                  </p:stCondLst>
+                                  <p:childTnLst>
+                                    <p:set>
+                                      <p:cBhvr>
+                                        <p:cTn id="6" dur="1" fill="hold">
+                                          <p:stCondLst>
+                                            <p:cond delay="0"/>
+                                          </p:stCondLst>
+                                        </p:cTn>
+                                        <p:tgtEl>
+                                          <p:spTgt spid="5"/>
+                                        </p:tgtEl>
+                                        <p:attrNameLst>
+                                          <p:attrName>style.visibility</p:attrName>
+                                        </p:attrNameLst>
+                                      </p:cBhvr>
+                                      <p:to>
+                                        <p:strVal val="visible"/>
+                                      </p:to>
+                                    </p:set>
+                                  </p:childTnLst>
+                                </p:cTn>
+                              </p:par>
+                            </p:childTnLst>
+                          </p:cTn>
+                        </p:par>
+                      </p:childTnLst>
+                    </p:cTn>
+                  </p:par>
+                  <p:par>
+                    <p:cTn id="7" fill="hold">
+                      <p:stCondLst>
+                        <p:cond delay="indefinite"/>
+                      </p:stCondLst>
+                      <p:childTnLst>
+                        <p:par>
+                          <p:cTn id="8" fill="hold">
+                            <p:stCondLst>
+                              <p:cond delay="0"/>
+                            </p:stCondLst>
+                            <p:childTnLst>
+                              <p:par>
+                                <p:cTn id="9" presetID="1" presetClass="entr" presetSubtype="0" fill="hold" grpId="1" nodeType="clickEffect">
+                                  <p:stCondLst>
+                                    <p:cond delay="0"/>
+                                  </p:stCondLst>
+                                  <p:childTnLst>
+                                    <p:set>
+                                      <p:cBhvr>
+                                        <p:cTn id="10" dur="1" fill="hold">
+                                          <p:stCondLst>
+                                            <p:cond delay="0"/>
+                                          </p:stCondLst>
+                                        </p:cTn>
+                                        <p:tgtEl>
+                                          <p:spTgt spid="5"/>
+                                        </p:tgtEl>
+                                        <p:attrNameLst>
+                                          <p:attrName>style.visibility</p:attrName>
+                                        </p:attrNameLst>
+                                      </p:cBhvr>
+                                      <p:to>
+                                        <p:strVal val="visible"/>
+                                      </p:to>
+                                    </p:set>
+                                  </p:childTnLst>
+                                </p:cTn>
+                              </p:par>
+                            </p:childTnLst>
+                          </p:cTn>
+                        </p:par>
+                      </p:childTnLst>
+                    </p:cTn>
+                  </p:par>
+                  <p:par>
+                    <p:cTn id="11" fill="hold">
+                      <p:stCondLst>
+                        <p:cond delay="indefinite"/>
+                      </p:stCondLst>
+                      <p:childTnLst>
+                        <p:par>
+                          <p:cTn id="12" fill="hold">
+                            <p:stCondLst>
+                              <p:cond delay="0"/>
+                            </p:stCondLst>
+                            <p:childTnLst>
+                              <p:par>
+                                <p:cTn id="13" presetID="1" presetClass="entr" presetSubtype="0" fill="hold" grpId="2" nodeType="clickEffect">
+                                  <p:stCondLst>
+                                    <p:cond delay="0"/>
+                                  </p:stCondLst>
+                                  <p:childTnLst>
+                                    <p:set>
+                                      <p:cBhvr>
+                                        <p:cTn id="14" dur="1" fill="hold">
+                                          <p:stCondLst>
+                                            <p:cond delay="0"/>
+                                          </p:stCondLst>
+                                        </p:cTn>
+                                        <p:tgtEl>
+                                          <p:spTgt spid="5"/>
+                                        </p:tgtEl>
+                                        <p:attrNameLst>
+                                          <p:attrName>style.visibility</p:attrName>
+                                        </p:attrNameLst>
+                                      </p:cBhvr>
+                                      <p:to>
+                                        <p:strVal val="visible"/>
+                                      </p:to>
+                                    </p:set>
+                                  </p:childTnLst>
+                                </p:cTn>
+                              </p:par>
+                            </p:childTnLst>
+                          </p:cTn>
+                        </p:par>
+                      </p:childTnLst>
+                    </p:cTn>
+                  </p:par>
+                </p:childTnLst>
+              </p:cTn>
+              <p:prevCondLst>
+                <p:cond evt="onPrev" delay="0">
+                  <p:tgtEl>
+                    <p:sldTgt/>
+                  </p:tgtEl>
+                </p:cond>
+              </p:prevCondLst>
+              <p:nextCondLst>
+                <p:cond evt="onNext" delay="0">
+                  <p:tgtEl>
+                    <p:sldTgt/>
+                  </p:tgtEl>
+                </p:cond>
+              </p:nextCondLst>
+            </p:seq>
+          </p:childTnLst>
+        </p:cTn>
+      </p:par>
+    </p:tnLst>
+    <p:bldLst>
+      <p:bldGraphic spid="5" grpId="0">
+        <p:bldAsOne/>
+      </p:bldGraphic>
+      <p:bldGraphic spid="5" grpId="1">
+        <p:bldAsOne/>
+      </p:bldGraphic>
+      <p:bldGraphic spid="5" grpId="2">
+        <p:bldAsOne/>
+      </p:bldGraphic>
+    </p:bldLst>
+  </p:timing>
 </p:sld>
 </file>
 
 <file path=ppt/slides/slide11.xml><?xml version="1.0" encoding="utf-8"?>
+<p:sld xmlns:a="http://schemas.openxmlformats.org/drawingml/2006/main" xmlns:r="http://schemas.openxmlformats.org/officeDocument/2006/relationships" xmlns:p="http://schemas.openxmlformats.org/presentationml/2006/main">
+  <p:cSld>
+    <p:bg>
+      <p:bgPr>
+        <a:solidFill>
+          <a:schemeClr val="bg1"/>
+        </a:solidFill>
+        <a:effectLst/>
+      </p:bgPr>
+    </p:bg>
+    <p:spTree>
+      <p:nvGrpSpPr>
+        <p:cNvPr id="1" name=""/>
+        <p:cNvGrpSpPr/>
+        <p:nvPr/>
+      </p:nvGrpSpPr>
+      <p:grpSpPr>
+        <a:xfrm>
+          <a:off x="0" y="0"/>
+          <a:ext cx="0" cy="0"/>
+          <a:chOff x="0" y="0"/>
+          <a:chExt cx="0" cy="0"/>
+        </a:xfrm>
+      </p:grpSpPr>
+      <p:sp useBgFill="1">
+        <p:nvSpPr>
+          <p:cNvPr id="8" name="Rectangle 7">
+            <a:extLst>
+              <a:ext uri="{FF2B5EF4-FFF2-40B4-BE49-F238E27FC236}">
+                <a16:creationId xmlns:a16="http://schemas.microsoft.com/office/drawing/2014/main" id="{DAF1966E-FD40-4A4A-B61B-C4DF7FA05F06}"/>
+              </a:ext>
+              <a:ext uri="{C183D7F6-B498-43B3-948B-1728B52AA6E4}">
+                <adec:decorative xmlns:adec="http://schemas.microsoft.com/office/drawing/2017/decorative" val="1"/>
+              </a:ext>
+            </a:extLst>
+          </p:cNvPr>
+          <p:cNvSpPr>
+            <a:spLocks noGrp="1" noRot="1" noChangeAspect="1" noMove="1" noResize="1" noEditPoints="1" noAdjustHandles="1" noChangeArrowheads="1" noChangeShapeType="1" noTextEdit="1"/>
+          </p:cNvSpPr>
+          <p:nvPr>
+            <p:extLst>
+              <p:ext uri="{386F3935-93C4-4BCD-93E2-E3B085C9AB24}">
+                <p16:designElem xmlns:p16="http://schemas.microsoft.com/office/powerpoint/2015/main" val="1"/>
+              </p:ext>
+            </p:extLst>
+          </p:nvPr>
+        </p:nvSpPr>
+        <p:spPr>
+          <a:xfrm>
+            <a:off x="0" y="0"/>
+            <a:ext cx="9144000" cy="6858000"/>
+          </a:xfrm>
+          <a:prstGeom prst="rect">
+            <a:avLst/>
+          </a:prstGeom>
+          <a:ln>
+            <a:noFill/>
+          </a:ln>
+        </p:spPr>
+        <p:style>
+          <a:lnRef idx="2">
+            <a:schemeClr val="accent1">
+              <a:shade val="50000"/>
+            </a:schemeClr>
+          </a:lnRef>
+          <a:fillRef idx="1">
+            <a:schemeClr val="accent1"/>
+          </a:fillRef>
+          <a:effectRef idx="0">
+            <a:schemeClr val="accent1"/>
+          </a:effectRef>
+          <a:fontRef idx="minor">
+            <a:schemeClr val="lt1"/>
+          </a:fontRef>
+        </p:style>
+        <p:txBody>
+          <a:bodyPr rtlCol="0" anchor="ctr"/>
+          <a:lstStyle/>
+          <a:p>
+            <a:pPr algn="ctr"/>
+            <a:endParaRPr lang="en-US"/>
+          </a:p>
+        </p:txBody>
+      </p:sp>
+      <p:sp useBgFill="1">
+        <p:nvSpPr>
+          <p:cNvPr id="10" name="Rectangle 9">
+            <a:extLst>
+              <a:ext uri="{FF2B5EF4-FFF2-40B4-BE49-F238E27FC236}">
+                <a16:creationId xmlns:a16="http://schemas.microsoft.com/office/drawing/2014/main" id="{047BFA19-D45E-416B-A404-7AF2F3F27017}"/>
+              </a:ext>
+              <a:ext uri="{C183D7F6-B498-43B3-948B-1728B52AA6E4}">
+                <adec:decorative xmlns:adec="http://schemas.microsoft.com/office/drawing/2017/decorative" val="1"/>
+              </a:ext>
+            </a:extLst>
+          </p:cNvPr>
+          <p:cNvSpPr>
+            <a:spLocks noGrp="1" noRot="1" noChangeAspect="1" noMove="1" noResize="1" noEditPoints="1" noAdjustHandles="1" noChangeArrowheads="1" noChangeShapeType="1" noTextEdit="1"/>
+          </p:cNvSpPr>
+          <p:nvPr>
+            <p:extLst>
+              <p:ext uri="{386F3935-93C4-4BCD-93E2-E3B085C9AB24}">
+                <p16:designElem xmlns:p16="http://schemas.microsoft.com/office/powerpoint/2015/main" val="1"/>
+              </p:ext>
+            </p:extLst>
+          </p:nvPr>
+        </p:nvSpPr>
+        <p:spPr>
+          <a:xfrm>
+            <a:off x="418656" y="0"/>
+            <a:ext cx="8375586" cy="2018806"/>
+          </a:xfrm>
+          <a:prstGeom prst="rect">
+            <a:avLst/>
+          </a:prstGeom>
+          <a:ln w="9525">
+            <a:solidFill>
+              <a:srgbClr val="E1E1E1"/>
+            </a:solidFill>
+          </a:ln>
+          <a:effectLst>
+            <a:outerShdw blurRad="50800" dist="38100" dir="2700000" algn="tl" rotWithShape="0">
+              <a:schemeClr val="bg1">
+                <a:lumMod val="85000"/>
+                <a:alpha val="50000"/>
+              </a:schemeClr>
+            </a:outerShdw>
+          </a:effectLst>
+        </p:spPr>
+        <p:style>
+          <a:lnRef idx="2">
+            <a:schemeClr val="accent1">
+              <a:shade val="50000"/>
+            </a:schemeClr>
+          </a:lnRef>
+          <a:fillRef idx="1">
+            <a:schemeClr val="accent1"/>
+          </a:fillRef>
+          <a:effectRef idx="0">
+            <a:schemeClr val="accent1"/>
+          </a:effectRef>
+          <a:fontRef idx="minor">
+            <a:schemeClr val="lt1"/>
+          </a:fontRef>
+        </p:style>
+        <p:txBody>
+          <a:bodyPr rtlCol="0" anchor="ctr"/>
+          <a:lstStyle/>
+          <a:p>
+            <a:pPr marL="0" marR="0" lvl="0" indent="0" algn="ctr" defTabSz="914400" rtl="0" eaLnBrk="1" fontAlgn="auto" latinLnBrk="0" hangingPunct="1">
+              <a:lnSpc>
+                <a:spcPct val="100000"/>
+              </a:lnSpc>
+              <a:spcBef>
+                <a:spcPts val="0"/>
+              </a:spcBef>
+              <a:spcAft>
+                <a:spcPts val="0"/>
+              </a:spcAft>
+              <a:buClrTx/>
+              <a:buSzTx/>
+              <a:buFontTx/>
+              <a:buNone/>
+              <a:tabLst/>
+              <a:defRPr/>
+            </a:pPr>
+            <a:endParaRPr kumimoji="0" lang="en-US" sz="1800" b="0" i="0" u="none" strike="noStrike" kern="1200" cap="none" spc="0" normalizeH="0" baseline="0" noProof="0">
+              <a:ln>
+                <a:noFill/>
+              </a:ln>
+              <a:solidFill>
+                <a:prstClr val="white"/>
+              </a:solidFill>
+              <a:effectLst/>
+              <a:uLnTx/>
+              <a:uFillTx/>
+              <a:latin typeface="Calibri" panose="020F0502020204030204"/>
+              <a:ea typeface="+mn-ea"/>
+              <a:cs typeface="+mn-cs"/>
+            </a:endParaRPr>
+          </a:p>
+        </p:txBody>
+      </p:sp>
+      <p:sp useBgFill="1">
+        <p:nvSpPr>
+          <p:cNvPr id="12" name="Rectangle 11">
+            <a:extLst>
+              <a:ext uri="{FF2B5EF4-FFF2-40B4-BE49-F238E27FC236}">
+                <a16:creationId xmlns:a16="http://schemas.microsoft.com/office/drawing/2014/main" id="{8E0105E7-23DB-4CF2-8258-FF47C7620F6E}"/>
+              </a:ext>
+              <a:ext uri="{C183D7F6-B498-43B3-948B-1728B52AA6E4}">
+                <adec:decorative xmlns:adec="http://schemas.microsoft.com/office/drawing/2017/decorative" val="1"/>
+              </a:ext>
+            </a:extLst>
+          </p:cNvPr>
+          <p:cNvSpPr>
+            <a:spLocks noGrp="1" noRot="1" noChangeAspect="1" noMove="1" noResize="1" noEditPoints="1" noAdjustHandles="1" noChangeArrowheads="1" noChangeShapeType="1" noTextEdit="1"/>
+          </p:cNvSpPr>
+          <p:nvPr>
+            <p:extLst>
+              <p:ext uri="{386F3935-93C4-4BCD-93E2-E3B085C9AB24}">
+                <p16:designElem xmlns:p16="http://schemas.microsoft.com/office/powerpoint/2015/main" val="1"/>
+              </p:ext>
+            </p:extLst>
+          </p:nvPr>
+        </p:nvSpPr>
+        <p:spPr>
+          <a:xfrm>
+            <a:off x="425196" y="0"/>
+            <a:ext cx="8366760" cy="2011680"/>
+          </a:xfrm>
+          <a:prstGeom prst="rect">
+            <a:avLst/>
+          </a:prstGeom>
+          <a:ln w="9525">
+            <a:noFill/>
+          </a:ln>
+          <a:effectLst/>
+        </p:spPr>
+        <p:style>
+          <a:lnRef idx="2">
+            <a:schemeClr val="accent1">
+              <a:shade val="50000"/>
+            </a:schemeClr>
+          </a:lnRef>
+          <a:fillRef idx="1">
+            <a:schemeClr val="accent1"/>
+          </a:fillRef>
+          <a:effectRef idx="0">
+            <a:schemeClr val="accent1"/>
+          </a:effectRef>
+          <a:fontRef idx="minor">
+            <a:schemeClr val="lt1"/>
+          </a:fontRef>
+        </p:style>
+        <p:txBody>
+          <a:bodyPr rtlCol="0" anchor="ctr"/>
+          <a:lstStyle/>
+          <a:p>
+            <a:pPr marL="0" marR="0" lvl="0" indent="0" algn="ctr" defTabSz="914400" rtl="0" eaLnBrk="1" fontAlgn="auto" latinLnBrk="0" hangingPunct="1">
+              <a:lnSpc>
+                <a:spcPct val="100000"/>
+              </a:lnSpc>
+              <a:spcBef>
+                <a:spcPts val="0"/>
+              </a:spcBef>
+              <a:spcAft>
+                <a:spcPts val="0"/>
+              </a:spcAft>
+              <a:buClrTx/>
+              <a:buSzTx/>
+              <a:buFontTx/>
+              <a:buNone/>
+              <a:tabLst/>
+              <a:defRPr/>
+            </a:pPr>
+            <a:endParaRPr kumimoji="0" lang="en-US" sz="1800" b="0" i="0" u="none" strike="noStrike" kern="1200" cap="none" spc="0" normalizeH="0" baseline="0" noProof="0">
+              <a:ln>
+                <a:noFill/>
+              </a:ln>
+              <a:solidFill>
+                <a:prstClr val="white"/>
+              </a:solidFill>
+              <a:effectLst/>
+              <a:uLnTx/>
+              <a:uFillTx/>
+              <a:latin typeface="Calibri" panose="020F0502020204030204"/>
+              <a:ea typeface="+mn-ea"/>
+              <a:cs typeface="+mn-cs"/>
+            </a:endParaRPr>
+          </a:p>
+        </p:txBody>
+      </p:sp>
+      <p:sp>
+        <p:nvSpPr>
+          <p:cNvPr id="2" name="Title 1">
+            <a:extLst>
+              <a:ext uri="{FF2B5EF4-FFF2-40B4-BE49-F238E27FC236}">
+                <a16:creationId xmlns:a16="http://schemas.microsoft.com/office/drawing/2014/main" id="{9421CC81-A078-194D-B08F-F2F7FADEA43B}"/>
+              </a:ext>
+            </a:extLst>
+          </p:cNvPr>
+          <p:cNvSpPr>
+            <a:spLocks noGrp="1"/>
+          </p:cNvSpPr>
+          <p:nvPr>
+            <p:ph type="title"/>
+          </p:nvPr>
+        </p:nvSpPr>
+        <p:spPr>
+          <a:xfrm>
+            <a:off x="836676" y="548640"/>
+            <a:ext cx="7626096" cy="1179576"/>
+          </a:xfrm>
+        </p:spPr>
+        <p:txBody>
+          <a:bodyPr>
+            <a:normAutofit/>
+          </a:bodyPr>
+          <a:lstStyle/>
+          <a:p>
+            <a:r>
+              <a:rPr lang="en-US" sz="3600" dirty="0" err="1"/>
+              <a:t>RandomForestClassifier</a:t>
+            </a:r>
+            <a:r>
+              <a:rPr lang="en-US" sz="3600" dirty="0"/>
+              <a:t> Metrics</a:t>
+            </a:r>
+          </a:p>
+        </p:txBody>
+      </p:sp>
+      <p:sp>
+        <p:nvSpPr>
+          <p:cNvPr id="14" name="Rectangle 13">
+            <a:extLst>
+              <a:ext uri="{FF2B5EF4-FFF2-40B4-BE49-F238E27FC236}">
+                <a16:creationId xmlns:a16="http://schemas.microsoft.com/office/drawing/2014/main" id="{074B4F7D-14B2-478B-8BF5-01E4E0C5D263}"/>
+              </a:ext>
+              <a:ext uri="{C183D7F6-B498-43B3-948B-1728B52AA6E4}">
+                <adec:decorative xmlns:adec="http://schemas.microsoft.com/office/drawing/2017/decorative" val="1"/>
+              </a:ext>
+            </a:extLst>
+          </p:cNvPr>
+          <p:cNvSpPr>
+            <a:spLocks noGrp="1" noRot="1" noChangeAspect="1" noMove="1" noResize="1" noEditPoints="1" noAdjustHandles="1" noChangeArrowheads="1" noChangeShapeType="1" noTextEdit="1"/>
+          </p:cNvSpPr>
+          <p:nvPr>
+            <p:extLst>
+              <p:ext uri="{386F3935-93C4-4BCD-93E2-E3B085C9AB24}">
+                <p16:designElem xmlns:p16="http://schemas.microsoft.com/office/powerpoint/2015/main" val="1"/>
+              </p:ext>
+            </p:extLst>
+          </p:nvPr>
+        </p:nvSpPr>
+        <p:spPr>
+          <a:xfrm>
+            <a:off x="374125" y="758952"/>
+            <a:ext cx="96012" cy="704088"/>
+          </a:xfrm>
+          <a:prstGeom prst="rect">
+            <a:avLst/>
+          </a:prstGeom>
+          <a:solidFill>
+            <a:schemeClr val="accent2"/>
+          </a:solidFill>
+          <a:ln>
+            <a:noFill/>
+          </a:ln>
+        </p:spPr>
+        <p:style>
+          <a:lnRef idx="2">
+            <a:schemeClr val="accent1">
+              <a:shade val="50000"/>
+            </a:schemeClr>
+          </a:lnRef>
+          <a:fillRef idx="1">
+            <a:schemeClr val="accent1"/>
+          </a:fillRef>
+          <a:effectRef idx="0">
+            <a:schemeClr val="accent1"/>
+          </a:effectRef>
+          <a:fontRef idx="minor">
+            <a:schemeClr val="lt1"/>
+          </a:fontRef>
+        </p:style>
+        <p:txBody>
+          <a:bodyPr rtlCol="0" anchor="ctr"/>
+          <a:lstStyle/>
+          <a:p>
+            <a:pPr algn="ctr"/>
+            <a:endParaRPr lang="en-US">
+              <a:solidFill>
+                <a:prstClr val="white"/>
+              </a:solidFill>
+              <a:latin typeface="Calibri" panose="020F0502020204030204"/>
+            </a:endParaRPr>
+          </a:p>
+        </p:txBody>
+      </p:sp>
+      <p:graphicFrame>
+        <p:nvGraphicFramePr>
+          <p:cNvPr id="4" name="Table 5">
+            <a:extLst>
+              <a:ext uri="{FF2B5EF4-FFF2-40B4-BE49-F238E27FC236}">
+                <a16:creationId xmlns:a16="http://schemas.microsoft.com/office/drawing/2014/main" id="{6E579985-2992-2C4D-A7D8-3B7D1B6F7B69}"/>
+              </a:ext>
+            </a:extLst>
+          </p:cNvPr>
+          <p:cNvGraphicFramePr>
+            <a:graphicFrameLocks noGrp="1"/>
+          </p:cNvGraphicFramePr>
+          <p:nvPr>
+            <p:extLst>
+              <p:ext uri="{D42A27DB-BD31-4B8C-83A1-F6EECF244321}">
+                <p14:modId xmlns:p14="http://schemas.microsoft.com/office/powerpoint/2010/main" val="1879287148"/>
+              </p:ext>
+            </p:extLst>
+          </p:nvPr>
+        </p:nvGraphicFramePr>
+        <p:xfrm>
+          <a:off x="836677" y="2446976"/>
+          <a:ext cx="7626097" cy="3454092"/>
+        </p:xfrm>
+        <a:graphic>
+          <a:graphicData uri="http://schemas.openxmlformats.org/drawingml/2006/table">
+            <a:tbl>
+              <a:tblPr firstRow="1" bandRow="1">
+                <a:tableStyleId>{5C22544A-7EE6-4342-B048-85BDC9FD1C3A}</a:tableStyleId>
+              </a:tblPr>
+              <a:tblGrid>
+                <a:gridCol w="1768300">
+                  <a:extLst>
+                    <a:ext uri="{9D8B030D-6E8A-4147-A177-3AD203B41FA5}">
+                      <a16:colId xmlns:a16="http://schemas.microsoft.com/office/drawing/2014/main" val="3194966742"/>
+                    </a:ext>
+                  </a:extLst>
+                </a:gridCol>
+                <a:gridCol w="1576092">
+                  <a:extLst>
+                    <a:ext uri="{9D8B030D-6E8A-4147-A177-3AD203B41FA5}">
+                      <a16:colId xmlns:a16="http://schemas.microsoft.com/office/drawing/2014/main" val="2767082159"/>
+                    </a:ext>
+                  </a:extLst>
+                </a:gridCol>
+                <a:gridCol w="1427235">
+                  <a:extLst>
+                    <a:ext uri="{9D8B030D-6E8A-4147-A177-3AD203B41FA5}">
+                      <a16:colId xmlns:a16="http://schemas.microsoft.com/office/drawing/2014/main" val="3856699749"/>
+                    </a:ext>
+                  </a:extLst>
+                </a:gridCol>
+                <a:gridCol w="1427235">
+                  <a:extLst>
+                    <a:ext uri="{9D8B030D-6E8A-4147-A177-3AD203B41FA5}">
+                      <a16:colId xmlns:a16="http://schemas.microsoft.com/office/drawing/2014/main" val="197753803"/>
+                    </a:ext>
+                  </a:extLst>
+                </a:gridCol>
+                <a:gridCol w="1427235">
+                  <a:extLst>
+                    <a:ext uri="{9D8B030D-6E8A-4147-A177-3AD203B41FA5}">
+                      <a16:colId xmlns:a16="http://schemas.microsoft.com/office/drawing/2014/main" val="3185455320"/>
+                    </a:ext>
+                  </a:extLst>
+                </a:gridCol>
+              </a:tblGrid>
+              <a:tr h="575682">
+                <a:tc>
+                  <a:txBody>
+                    <a:bodyPr/>
+                    <a:lstStyle/>
+                    <a:p>
+                      <a:pPr algn="ctr"/>
+                      <a:endParaRPr lang="en-US" sz="2000" dirty="0">
+                        <a:latin typeface="Adobe Caslon Pro" panose="0205050205050A020403" pitchFamily="18" charset="77"/>
+                      </a:endParaRPr>
+                    </a:p>
+                  </a:txBody>
+                  <a:tcPr anchor="ctr"/>
+                </a:tc>
+                <a:tc>
+                  <a:txBody>
+                    <a:bodyPr/>
+                    <a:lstStyle/>
+                    <a:p>
+                      <a:pPr algn="ctr"/>
+                      <a:r>
+                        <a:rPr lang="en-US" sz="2000" dirty="0">
+                          <a:latin typeface="Adobe Caslon Pro" panose="0205050205050A020403" pitchFamily="18" charset="77"/>
+                        </a:rPr>
+                        <a:t>Precision</a:t>
+                      </a:r>
+                    </a:p>
+                  </a:txBody>
+                  <a:tcPr anchor="ctr"/>
+                </a:tc>
+                <a:tc>
+                  <a:txBody>
+                    <a:bodyPr/>
+                    <a:lstStyle/>
+                    <a:p>
+                      <a:pPr algn="ctr"/>
+                      <a:r>
+                        <a:rPr lang="en-US" sz="2000" dirty="0">
+                          <a:latin typeface="Adobe Caslon Pro" panose="0205050205050A020403" pitchFamily="18" charset="77"/>
+                        </a:rPr>
+                        <a:t>Recall</a:t>
+                      </a:r>
+                    </a:p>
+                  </a:txBody>
+                  <a:tcPr anchor="ctr"/>
+                </a:tc>
+                <a:tc>
+                  <a:txBody>
+                    <a:bodyPr/>
+                    <a:lstStyle/>
+                    <a:p>
+                      <a:pPr algn="ctr"/>
+                      <a:r>
+                        <a:rPr lang="en-US" sz="2000" dirty="0">
+                          <a:latin typeface="Adobe Caslon Pro" panose="0205050205050A020403" pitchFamily="18" charset="77"/>
+                        </a:rPr>
+                        <a:t>F1-score</a:t>
+                      </a:r>
+                    </a:p>
+                  </a:txBody>
+                  <a:tcPr anchor="ctr"/>
+                </a:tc>
+                <a:tc>
+                  <a:txBody>
+                    <a:bodyPr/>
+                    <a:lstStyle/>
+                    <a:p>
+                      <a:pPr algn="ctr"/>
+                      <a:r>
+                        <a:rPr lang="en-US" sz="2000" dirty="0">
+                          <a:latin typeface="Adobe Caslon Pro" panose="0205050205050A020403" pitchFamily="18" charset="77"/>
+                        </a:rPr>
+                        <a:t>Support</a:t>
+                      </a:r>
+                    </a:p>
+                  </a:txBody>
+                  <a:tcPr anchor="ctr"/>
+                </a:tc>
+                <a:extLst>
+                  <a:ext uri="{0D108BD9-81ED-4DB2-BD59-A6C34878D82A}">
+                    <a16:rowId xmlns:a16="http://schemas.microsoft.com/office/drawing/2014/main" val="2241646935"/>
+                  </a:ext>
+                </a:extLst>
+              </a:tr>
+              <a:tr h="575682">
+                <a:tc>
+                  <a:txBody>
+                    <a:bodyPr/>
+                    <a:lstStyle/>
+                    <a:p>
+                      <a:pPr algn="ctr"/>
+                      <a:r>
+                        <a:rPr lang="en-US" sz="2000" dirty="0">
+                          <a:latin typeface="Adobe Caslon Pro" panose="0205050205050A020403" pitchFamily="18" charset="77"/>
+                        </a:rPr>
+                        <a:t>no</a:t>
+                      </a:r>
+                    </a:p>
+                  </a:txBody>
+                  <a:tcPr anchor="ctr"/>
+                </a:tc>
+                <a:tc>
+                  <a:txBody>
+                    <a:bodyPr/>
+                    <a:lstStyle/>
+                    <a:p>
+                      <a:pPr algn="ctr"/>
+                      <a:r>
+                        <a:rPr lang="en-US" sz="2000" dirty="0">
+                          <a:latin typeface="Adobe Caslon Pro" panose="0205050205050A020403" pitchFamily="18" charset="77"/>
+                        </a:rPr>
+                        <a:t>0.92</a:t>
+                      </a:r>
+                    </a:p>
+                  </a:txBody>
+                  <a:tcPr anchor="ctr"/>
+                </a:tc>
+                <a:tc>
+                  <a:txBody>
+                    <a:bodyPr/>
+                    <a:lstStyle/>
+                    <a:p>
+                      <a:pPr algn="ctr"/>
+                      <a:r>
+                        <a:rPr lang="en-US" sz="2000" dirty="0">
+                          <a:latin typeface="Adobe Caslon Pro" panose="0205050205050A020403" pitchFamily="18" charset="77"/>
+                        </a:rPr>
+                        <a:t>0.95</a:t>
+                      </a:r>
+                    </a:p>
+                  </a:txBody>
+                  <a:tcPr anchor="ctr"/>
+                </a:tc>
+                <a:tc>
+                  <a:txBody>
+                    <a:bodyPr/>
+                    <a:lstStyle/>
+                    <a:p>
+                      <a:pPr algn="ctr"/>
+                      <a:r>
+                        <a:rPr lang="en-US" sz="2000" dirty="0">
+                          <a:latin typeface="Adobe Caslon Pro" panose="0205050205050A020403" pitchFamily="18" charset="77"/>
+                        </a:rPr>
+                        <a:t>0.93</a:t>
+                      </a:r>
+                    </a:p>
+                  </a:txBody>
+                  <a:tcPr anchor="ctr"/>
+                </a:tc>
+                <a:tc>
+                  <a:txBody>
+                    <a:bodyPr/>
+                    <a:lstStyle/>
+                    <a:p>
+                      <a:pPr algn="ctr"/>
+                      <a:r>
+                        <a:rPr lang="en-US" sz="2000" dirty="0">
+                          <a:latin typeface="Adobe Caslon Pro" panose="0205050205050A020403" pitchFamily="18" charset="77"/>
+                        </a:rPr>
+                        <a:t>3928</a:t>
+                      </a:r>
+                    </a:p>
+                  </a:txBody>
+                  <a:tcPr anchor="ctr"/>
+                </a:tc>
+                <a:extLst>
+                  <a:ext uri="{0D108BD9-81ED-4DB2-BD59-A6C34878D82A}">
+                    <a16:rowId xmlns:a16="http://schemas.microsoft.com/office/drawing/2014/main" val="2883426637"/>
+                  </a:ext>
+                </a:extLst>
+              </a:tr>
+              <a:tr h="575682">
+                <a:tc>
+                  <a:txBody>
+                    <a:bodyPr/>
+                    <a:lstStyle/>
+                    <a:p>
+                      <a:pPr algn="ctr"/>
+                      <a:r>
+                        <a:rPr lang="en-US" sz="2000" dirty="0">
+                          <a:latin typeface="Adobe Caslon Pro" panose="0205050205050A020403" pitchFamily="18" charset="77"/>
+                        </a:rPr>
+                        <a:t>yes</a:t>
+                      </a:r>
+                    </a:p>
+                  </a:txBody>
+                  <a:tcPr anchor="ctr"/>
+                </a:tc>
+                <a:tc>
+                  <a:txBody>
+                    <a:bodyPr/>
+                    <a:lstStyle/>
+                    <a:p>
+                      <a:pPr algn="ctr"/>
+                      <a:r>
+                        <a:rPr lang="en-US" sz="2000" dirty="0">
+                          <a:latin typeface="Adobe Caslon Pro" panose="0205050205050A020403" pitchFamily="18" charset="77"/>
+                        </a:rPr>
+                        <a:t>0.94</a:t>
+                      </a:r>
+                    </a:p>
+                  </a:txBody>
+                  <a:tcPr anchor="ctr"/>
+                </a:tc>
+                <a:tc>
+                  <a:txBody>
+                    <a:bodyPr/>
+                    <a:lstStyle/>
+                    <a:p>
+                      <a:pPr algn="ctr"/>
+                      <a:r>
+                        <a:rPr lang="en-US" sz="2000" dirty="0">
+                          <a:latin typeface="Adobe Caslon Pro" panose="0205050205050A020403" pitchFamily="18" charset="77"/>
+                        </a:rPr>
+                        <a:t>0.90</a:t>
+                      </a:r>
+                    </a:p>
+                  </a:txBody>
+                  <a:tcPr anchor="ctr"/>
+                </a:tc>
+                <a:tc>
+                  <a:txBody>
+                    <a:bodyPr/>
+                    <a:lstStyle/>
+                    <a:p>
+                      <a:pPr algn="ctr"/>
+                      <a:r>
+                        <a:rPr lang="en-US" sz="2000" dirty="0">
+                          <a:latin typeface="Adobe Caslon Pro" panose="0205050205050A020403" pitchFamily="18" charset="77"/>
+                        </a:rPr>
+                        <a:t>0.92</a:t>
+                      </a:r>
+                    </a:p>
+                  </a:txBody>
+                  <a:tcPr anchor="ctr"/>
+                </a:tc>
+                <a:tc>
+                  <a:txBody>
+                    <a:bodyPr/>
+                    <a:lstStyle/>
+                    <a:p>
+                      <a:pPr algn="ctr"/>
+                      <a:r>
+                        <a:rPr lang="en-US" sz="2000" dirty="0">
+                          <a:latin typeface="Adobe Caslon Pro" panose="0205050205050A020403" pitchFamily="18" charset="77"/>
+                        </a:rPr>
+                        <a:t>3501</a:t>
+                      </a:r>
+                    </a:p>
+                  </a:txBody>
+                  <a:tcPr anchor="ctr"/>
+                </a:tc>
+                <a:extLst>
+                  <a:ext uri="{0D108BD9-81ED-4DB2-BD59-A6C34878D82A}">
+                    <a16:rowId xmlns:a16="http://schemas.microsoft.com/office/drawing/2014/main" val="2910262463"/>
+                  </a:ext>
+                </a:extLst>
+              </a:tr>
+              <a:tr h="575682">
+                <a:tc>
+                  <a:txBody>
+                    <a:bodyPr/>
+                    <a:lstStyle/>
+                    <a:p>
+                      <a:pPr algn="ctr"/>
+                      <a:r>
+                        <a:rPr lang="en-US" sz="2000" dirty="0">
+                          <a:latin typeface="Adobe Caslon Pro" panose="0205050205050A020403" pitchFamily="18" charset="77"/>
+                        </a:rPr>
+                        <a:t>accuracy</a:t>
+                      </a:r>
+                    </a:p>
+                  </a:txBody>
+                  <a:tcPr anchor="ctr"/>
+                </a:tc>
+                <a:tc>
+                  <a:txBody>
+                    <a:bodyPr/>
+                    <a:lstStyle/>
+                    <a:p>
+                      <a:pPr algn="ctr"/>
+                      <a:endParaRPr lang="en-US" sz="2000">
+                        <a:latin typeface="Adobe Caslon Pro" panose="0205050205050A020403" pitchFamily="18" charset="77"/>
+                      </a:endParaRPr>
+                    </a:p>
+                  </a:txBody>
+                  <a:tcPr anchor="ctr"/>
+                </a:tc>
+                <a:tc>
+                  <a:txBody>
+                    <a:bodyPr/>
+                    <a:lstStyle/>
+                    <a:p>
+                      <a:pPr algn="ctr"/>
+                      <a:endParaRPr lang="en-US" sz="2000">
+                        <a:latin typeface="Adobe Caslon Pro" panose="0205050205050A020403" pitchFamily="18" charset="77"/>
+                      </a:endParaRPr>
+                    </a:p>
+                  </a:txBody>
+                  <a:tcPr anchor="ctr"/>
+                </a:tc>
+                <a:tc>
+                  <a:txBody>
+                    <a:bodyPr/>
+                    <a:lstStyle/>
+                    <a:p>
+                      <a:pPr algn="ctr"/>
+                      <a:r>
+                        <a:rPr lang="en-US" sz="2000" dirty="0">
+                          <a:latin typeface="Adobe Caslon Pro" panose="0205050205050A020403" pitchFamily="18" charset="77"/>
+                        </a:rPr>
+                        <a:t>0.93</a:t>
+                      </a:r>
+                    </a:p>
+                  </a:txBody>
+                  <a:tcPr anchor="ctr"/>
+                </a:tc>
+                <a:tc>
+                  <a:txBody>
+                    <a:bodyPr/>
+                    <a:lstStyle/>
+                    <a:p>
+                      <a:pPr algn="ctr"/>
+                      <a:r>
+                        <a:rPr lang="en-US" sz="2000" dirty="0">
+                          <a:latin typeface="Adobe Caslon Pro" panose="0205050205050A020403" pitchFamily="18" charset="77"/>
+                        </a:rPr>
+                        <a:t>7429</a:t>
+                      </a:r>
+                    </a:p>
+                  </a:txBody>
+                  <a:tcPr anchor="ctr"/>
+                </a:tc>
+                <a:extLst>
+                  <a:ext uri="{0D108BD9-81ED-4DB2-BD59-A6C34878D82A}">
+                    <a16:rowId xmlns:a16="http://schemas.microsoft.com/office/drawing/2014/main" val="580737865"/>
+                  </a:ext>
+                </a:extLst>
+              </a:tr>
+              <a:tr h="575682">
+                <a:tc>
+                  <a:txBody>
+                    <a:bodyPr/>
+                    <a:lstStyle/>
+                    <a:p>
+                      <a:pPr algn="ctr"/>
+                      <a:r>
+                        <a:rPr lang="en-US" sz="2000" dirty="0">
+                          <a:latin typeface="Adobe Caslon Pro" panose="0205050205050A020403" pitchFamily="18" charset="77"/>
+                        </a:rPr>
+                        <a:t>macro avg</a:t>
+                      </a:r>
+                    </a:p>
+                  </a:txBody>
+                  <a:tcPr anchor="ctr"/>
+                </a:tc>
+                <a:tc>
+                  <a:txBody>
+                    <a:bodyPr/>
+                    <a:lstStyle/>
+                    <a:p>
+                      <a:pPr algn="ctr"/>
+                      <a:r>
+                        <a:rPr lang="en-US" sz="2000" dirty="0">
+                          <a:latin typeface="Adobe Caslon Pro" panose="0205050205050A020403" pitchFamily="18" charset="77"/>
+                        </a:rPr>
+                        <a:t>0.93</a:t>
+                      </a:r>
+                    </a:p>
+                  </a:txBody>
+                  <a:tcPr anchor="ctr"/>
+                </a:tc>
+                <a:tc>
+                  <a:txBody>
+                    <a:bodyPr/>
+                    <a:lstStyle/>
+                    <a:p>
+                      <a:pPr algn="ctr"/>
+                      <a:r>
+                        <a:rPr lang="en-US" sz="2000" dirty="0">
+                          <a:latin typeface="Adobe Caslon Pro" panose="0205050205050A020403" pitchFamily="18" charset="77"/>
+                        </a:rPr>
+                        <a:t>0.93</a:t>
+                      </a:r>
+                    </a:p>
+                  </a:txBody>
+                  <a:tcPr anchor="ctr"/>
+                </a:tc>
+                <a:tc>
+                  <a:txBody>
+                    <a:bodyPr/>
+                    <a:lstStyle/>
+                    <a:p>
+                      <a:pPr algn="ctr"/>
+                      <a:r>
+                        <a:rPr lang="en-US" sz="2000" dirty="0">
+                          <a:latin typeface="Adobe Caslon Pro" panose="0205050205050A020403" pitchFamily="18" charset="77"/>
+                        </a:rPr>
+                        <a:t>0.93</a:t>
+                      </a:r>
+                    </a:p>
+                  </a:txBody>
+                  <a:tcPr anchor="ctr"/>
+                </a:tc>
+                <a:tc>
+                  <a:txBody>
+                    <a:bodyPr/>
+                    <a:lstStyle/>
+                    <a:p>
+                      <a:pPr algn="ctr"/>
+                      <a:r>
+                        <a:rPr lang="en-US" sz="2000" dirty="0">
+                          <a:latin typeface="Adobe Caslon Pro" panose="0205050205050A020403" pitchFamily="18" charset="77"/>
+                        </a:rPr>
+                        <a:t>7429</a:t>
+                      </a:r>
+                    </a:p>
+                  </a:txBody>
+                  <a:tcPr anchor="ctr"/>
+                </a:tc>
+                <a:extLst>
+                  <a:ext uri="{0D108BD9-81ED-4DB2-BD59-A6C34878D82A}">
+                    <a16:rowId xmlns:a16="http://schemas.microsoft.com/office/drawing/2014/main" val="1517535697"/>
+                  </a:ext>
+                </a:extLst>
+              </a:tr>
+              <a:tr h="575682">
+                <a:tc>
+                  <a:txBody>
+                    <a:bodyPr/>
+                    <a:lstStyle/>
+                    <a:p>
+                      <a:pPr algn="ctr"/>
+                      <a:r>
+                        <a:rPr lang="en-US" sz="2000" dirty="0">
+                          <a:latin typeface="Adobe Caslon Pro" panose="0205050205050A020403" pitchFamily="18" charset="77"/>
+                        </a:rPr>
+                        <a:t>weighted avg</a:t>
+                      </a:r>
+                    </a:p>
+                  </a:txBody>
+                  <a:tcPr anchor="ctr"/>
+                </a:tc>
+                <a:tc>
+                  <a:txBody>
+                    <a:bodyPr/>
+                    <a:lstStyle/>
+                    <a:p>
+                      <a:pPr algn="ctr"/>
+                      <a:r>
+                        <a:rPr lang="en-US" sz="2000" dirty="0">
+                          <a:latin typeface="Adobe Caslon Pro" panose="0205050205050A020403" pitchFamily="18" charset="77"/>
+                        </a:rPr>
+                        <a:t>0.93</a:t>
+                      </a:r>
+                    </a:p>
+                  </a:txBody>
+                  <a:tcPr anchor="ctr"/>
+                </a:tc>
+                <a:tc>
+                  <a:txBody>
+                    <a:bodyPr/>
+                    <a:lstStyle/>
+                    <a:p>
+                      <a:pPr algn="ctr"/>
+                      <a:r>
+                        <a:rPr lang="en-US" sz="2000" dirty="0">
+                          <a:latin typeface="Adobe Caslon Pro" panose="0205050205050A020403" pitchFamily="18" charset="77"/>
+                        </a:rPr>
+                        <a:t>0.93</a:t>
+                      </a:r>
+                    </a:p>
+                  </a:txBody>
+                  <a:tcPr anchor="ctr"/>
+                </a:tc>
+                <a:tc>
+                  <a:txBody>
+                    <a:bodyPr/>
+                    <a:lstStyle/>
+                    <a:p>
+                      <a:pPr algn="ctr"/>
+                      <a:r>
+                        <a:rPr lang="en-US" sz="2000" dirty="0">
+                          <a:latin typeface="Adobe Caslon Pro" panose="0205050205050A020403" pitchFamily="18" charset="77"/>
+                        </a:rPr>
+                        <a:t>0.93</a:t>
+                      </a:r>
+                    </a:p>
+                  </a:txBody>
+                  <a:tcPr anchor="ctr"/>
+                </a:tc>
+                <a:tc>
+                  <a:txBody>
+                    <a:bodyPr/>
+                    <a:lstStyle/>
+                    <a:p>
+                      <a:pPr algn="ctr"/>
+                      <a:r>
+                        <a:rPr lang="en-US" sz="2000" dirty="0">
+                          <a:latin typeface="Adobe Caslon Pro" panose="0205050205050A020403" pitchFamily="18" charset="77"/>
+                        </a:rPr>
+                        <a:t>7429</a:t>
+                      </a:r>
+                    </a:p>
+                  </a:txBody>
+                  <a:tcPr anchor="ctr"/>
+                </a:tc>
+                <a:extLst>
+                  <a:ext uri="{0D108BD9-81ED-4DB2-BD59-A6C34878D82A}">
+                    <a16:rowId xmlns:a16="http://schemas.microsoft.com/office/drawing/2014/main" val="4192734662"/>
+                  </a:ext>
+                </a:extLst>
+              </a:tr>
+            </a:tbl>
+          </a:graphicData>
+        </a:graphic>
+      </p:graphicFrame>
+    </p:spTree>
+    <p:extLst>
+      <p:ext uri="{BB962C8B-B14F-4D97-AF65-F5344CB8AC3E}">
+        <p14:creationId xmlns:p14="http://schemas.microsoft.com/office/powerpoint/2010/main" val="580319337"/>
+      </p:ext>
+    </p:extLst>
+  </p:cSld>
+  <p:clrMapOvr>
+    <a:masterClrMapping/>
+  </p:clrMapOvr>
+</p:sld>
+</file>
+
+<file path=ppt/slides/slide12.xml><?xml version="1.0" encoding="utf-8"?>
 <p:sld xmlns:a="http://schemas.openxmlformats.org/drawingml/2006/main" xmlns:r="http://schemas.openxmlformats.org/officeDocument/2006/relationships" xmlns:p="http://schemas.openxmlformats.org/presentationml/2006/main">
   <p:cSld>
     <p:bg>
@@ -12802,10 +13996,10 @@
       </p:sp>
       <p:pic>
         <p:nvPicPr>
-          <p:cNvPr id="1028" name="Picture 4">
+          <p:cNvPr id="2050" name="Picture 2">
             <a:extLst>
               <a:ext uri="{FF2B5EF4-FFF2-40B4-BE49-F238E27FC236}">
-                <a16:creationId xmlns:a16="http://schemas.microsoft.com/office/drawing/2014/main" id="{F5EBC453-74A0-524F-9543-A9D84A3DCE6F}"/>
+                <a16:creationId xmlns:a16="http://schemas.microsoft.com/office/drawing/2014/main" id="{38259FBF-E97C-9B44-90DE-C88348ACD0D9}"/>
               </a:ext>
             </a:extLst>
           </p:cNvPr>
@@ -12822,13 +14016,13 @@
               </a:ext>
             </a:extLst>
           </a:blip>
-          <a:srcRect t="9002"/>
+          <a:srcRect t="10012"/>
           <a:stretch/>
         </p:blipFill>
         <p:spPr bwMode="auto">
           <a:xfrm>
-            <a:off x="1635358" y="2148113"/>
-            <a:ext cx="5873284" cy="4310743"/>
+            <a:off x="1848442" y="2254105"/>
+            <a:ext cx="4777429" cy="3467507"/>
           </a:xfrm>
           <a:prstGeom prst="rect">
             <a:avLst/>
@@ -12858,7 +14052,7 @@
 </p:sld>
 </file>
 
-<file path=ppt/slides/slide12.xml><?xml version="1.0" encoding="utf-8"?>
+<file path=ppt/slides/slide13.xml><?xml version="1.0" encoding="utf-8"?>
 <p:sld xmlns:a="http://schemas.openxmlformats.org/drawingml/2006/main" xmlns:r="http://schemas.openxmlformats.org/officeDocument/2006/relationships" xmlns:p="http://schemas.openxmlformats.org/presentationml/2006/main">
   <p:cSld>
     <p:bg>
@@ -13237,10 +14431,10 @@
       </p:sp>
       <p:pic>
         <p:nvPicPr>
-          <p:cNvPr id="2050" name="Picture 2">
+          <p:cNvPr id="1028" name="Picture 4">
             <a:extLst>
               <a:ext uri="{FF2B5EF4-FFF2-40B4-BE49-F238E27FC236}">
-                <a16:creationId xmlns:a16="http://schemas.microsoft.com/office/drawing/2014/main" id="{493600F8-3162-AD49-B160-490718E16537}"/>
+                <a16:creationId xmlns:a16="http://schemas.microsoft.com/office/drawing/2014/main" id="{F24112FE-73E0-DF45-A5CE-F3A2A1F93F9C}"/>
               </a:ext>
             </a:extLst>
           </p:cNvPr>
@@ -13264,8 +14458,8 @@
         </p:blipFill>
         <p:spPr bwMode="auto">
           <a:xfrm>
-            <a:off x="232229" y="2138116"/>
-            <a:ext cx="8038468" cy="4471398"/>
+            <a:off x="757220" y="2317900"/>
+            <a:ext cx="7423149" cy="4129127"/>
           </a:xfrm>
           <a:prstGeom prst="rect">
             <a:avLst/>
@@ -13295,7 +14489,7 @@
 </p:sld>
 </file>
 
-<file path=ppt/slides/slide13.xml><?xml version="1.0" encoding="utf-8"?>
+<file path=ppt/slides/slide14.xml><?xml version="1.0" encoding="utf-8"?>
 <p:sld xmlns:a="http://schemas.openxmlformats.org/drawingml/2006/main" xmlns:r="http://schemas.openxmlformats.org/officeDocument/2006/relationships" xmlns:p="http://schemas.openxmlformats.org/presentationml/2006/main">
   <p:cSld>
     <p:bg>
@@ -13732,7 +14926,7 @@
 </p:sld>
 </file>
 
-<file path=ppt/slides/slide14.xml><?xml version="1.0" encoding="utf-8"?>
+<file path=ppt/slides/slide15.xml><?xml version="1.0" encoding="utf-8"?>
 <p:sld xmlns:a="http://schemas.openxmlformats.org/drawingml/2006/main" xmlns:r="http://schemas.openxmlformats.org/officeDocument/2006/relationships" xmlns:p="http://schemas.openxmlformats.org/presentationml/2006/main">
   <p:cSld>
     <p:bg>
@@ -15149,6 +16343,330 @@
   <p:clrMapOvr>
     <a:masterClrMapping/>
   </p:clrMapOvr>
+  <p:timing>
+    <p:tnLst>
+      <p:par>
+        <p:cTn id="1" dur="indefinite" restart="never" nodeType="tmRoot">
+          <p:childTnLst>
+            <p:seq concurrent="1" nextAc="seek">
+              <p:cTn id="2" dur="indefinite" nodeType="mainSeq">
+                <p:childTnLst>
+                  <p:par>
+                    <p:cTn id="3" fill="hold">
+                      <p:stCondLst>
+                        <p:cond delay="indefinite"/>
+                      </p:stCondLst>
+                      <p:childTnLst>
+                        <p:par>
+                          <p:cTn id="4" fill="hold">
+                            <p:stCondLst>
+                              <p:cond delay="0"/>
+                            </p:stCondLst>
+                            <p:childTnLst>
+                              <p:par>
+                                <p:cTn id="5" presetID="1" presetClass="entr" presetSubtype="0" fill="hold" nodeType="clickEffect">
+                                  <p:stCondLst>
+                                    <p:cond delay="0"/>
+                                  </p:stCondLst>
+                                  <p:childTnLst>
+                                    <p:set>
+                                      <p:cBhvr>
+                                        <p:cTn id="6" dur="1" fill="hold">
+                                          <p:stCondLst>
+                                            <p:cond delay="0"/>
+                                          </p:stCondLst>
+                                        </p:cTn>
+                                        <p:tgtEl>
+                                          <p:spTgt spid="3">
+                                            <p:txEl>
+                                              <p:pRg st="0" end="0"/>
+                                            </p:txEl>
+                                          </p:spTgt>
+                                        </p:tgtEl>
+                                        <p:attrNameLst>
+                                          <p:attrName>style.visibility</p:attrName>
+                                        </p:attrNameLst>
+                                      </p:cBhvr>
+                                      <p:to>
+                                        <p:strVal val="visible"/>
+                                      </p:to>
+                                    </p:set>
+                                  </p:childTnLst>
+                                </p:cTn>
+                              </p:par>
+                            </p:childTnLst>
+                          </p:cTn>
+                        </p:par>
+                      </p:childTnLst>
+                    </p:cTn>
+                  </p:par>
+                  <p:par>
+                    <p:cTn id="7" fill="hold">
+                      <p:stCondLst>
+                        <p:cond delay="indefinite"/>
+                      </p:stCondLst>
+                      <p:childTnLst>
+                        <p:par>
+                          <p:cTn id="8" fill="hold">
+                            <p:stCondLst>
+                              <p:cond delay="0"/>
+                            </p:stCondLst>
+                            <p:childTnLst>
+                              <p:par>
+                                <p:cTn id="9" presetID="1" presetClass="entr" presetSubtype="0" fill="hold" nodeType="clickEffect">
+                                  <p:stCondLst>
+                                    <p:cond delay="0"/>
+                                  </p:stCondLst>
+                                  <p:childTnLst>
+                                    <p:set>
+                                      <p:cBhvr>
+                                        <p:cTn id="10" dur="1" fill="hold">
+                                          <p:stCondLst>
+                                            <p:cond delay="0"/>
+                                          </p:stCondLst>
+                                        </p:cTn>
+                                        <p:tgtEl>
+                                          <p:spTgt spid="3">
+                                            <p:txEl>
+                                              <p:pRg st="1" end="1"/>
+                                            </p:txEl>
+                                          </p:spTgt>
+                                        </p:tgtEl>
+                                        <p:attrNameLst>
+                                          <p:attrName>style.visibility</p:attrName>
+                                        </p:attrNameLst>
+                                      </p:cBhvr>
+                                      <p:to>
+                                        <p:strVal val="visible"/>
+                                      </p:to>
+                                    </p:set>
+                                  </p:childTnLst>
+                                </p:cTn>
+                              </p:par>
+                            </p:childTnLst>
+                          </p:cTn>
+                        </p:par>
+                      </p:childTnLst>
+                    </p:cTn>
+                  </p:par>
+                  <p:par>
+                    <p:cTn id="11" fill="hold">
+                      <p:stCondLst>
+                        <p:cond delay="indefinite"/>
+                      </p:stCondLst>
+                      <p:childTnLst>
+                        <p:par>
+                          <p:cTn id="12" fill="hold">
+                            <p:stCondLst>
+                              <p:cond delay="0"/>
+                            </p:stCondLst>
+                            <p:childTnLst>
+                              <p:par>
+                                <p:cTn id="13" presetID="1" presetClass="entr" presetSubtype="0" fill="hold" nodeType="clickEffect">
+                                  <p:stCondLst>
+                                    <p:cond delay="0"/>
+                                  </p:stCondLst>
+                                  <p:childTnLst>
+                                    <p:set>
+                                      <p:cBhvr>
+                                        <p:cTn id="14" dur="1" fill="hold">
+                                          <p:stCondLst>
+                                            <p:cond delay="0"/>
+                                          </p:stCondLst>
+                                        </p:cTn>
+                                        <p:tgtEl>
+                                          <p:spTgt spid="3">
+                                            <p:txEl>
+                                              <p:pRg st="2" end="2"/>
+                                            </p:txEl>
+                                          </p:spTgt>
+                                        </p:tgtEl>
+                                        <p:attrNameLst>
+                                          <p:attrName>style.visibility</p:attrName>
+                                        </p:attrNameLst>
+                                      </p:cBhvr>
+                                      <p:to>
+                                        <p:strVal val="visible"/>
+                                      </p:to>
+                                    </p:set>
+                                  </p:childTnLst>
+                                </p:cTn>
+                              </p:par>
+                            </p:childTnLst>
+                          </p:cTn>
+                        </p:par>
+                      </p:childTnLst>
+                    </p:cTn>
+                  </p:par>
+                  <p:par>
+                    <p:cTn id="15" fill="hold">
+                      <p:stCondLst>
+                        <p:cond delay="indefinite"/>
+                      </p:stCondLst>
+                      <p:childTnLst>
+                        <p:par>
+                          <p:cTn id="16" fill="hold">
+                            <p:stCondLst>
+                              <p:cond delay="0"/>
+                            </p:stCondLst>
+                            <p:childTnLst>
+                              <p:par>
+                                <p:cTn id="17" presetID="1" presetClass="entr" presetSubtype="0" fill="hold" nodeType="clickEffect">
+                                  <p:stCondLst>
+                                    <p:cond delay="0"/>
+                                  </p:stCondLst>
+                                  <p:childTnLst>
+                                    <p:set>
+                                      <p:cBhvr>
+                                        <p:cTn id="18" dur="1" fill="hold">
+                                          <p:stCondLst>
+                                            <p:cond delay="0"/>
+                                          </p:stCondLst>
+                                        </p:cTn>
+                                        <p:tgtEl>
+                                          <p:spTgt spid="3">
+                                            <p:txEl>
+                                              <p:pRg st="3" end="3"/>
+                                            </p:txEl>
+                                          </p:spTgt>
+                                        </p:tgtEl>
+                                        <p:attrNameLst>
+                                          <p:attrName>style.visibility</p:attrName>
+                                        </p:attrNameLst>
+                                      </p:cBhvr>
+                                      <p:to>
+                                        <p:strVal val="visible"/>
+                                      </p:to>
+                                    </p:set>
+                                  </p:childTnLst>
+                                </p:cTn>
+                              </p:par>
+                            </p:childTnLst>
+                          </p:cTn>
+                        </p:par>
+                      </p:childTnLst>
+                    </p:cTn>
+                  </p:par>
+                  <p:par>
+                    <p:cTn id="19" fill="hold">
+                      <p:stCondLst>
+                        <p:cond delay="indefinite"/>
+                      </p:stCondLst>
+                      <p:childTnLst>
+                        <p:par>
+                          <p:cTn id="20" fill="hold">
+                            <p:stCondLst>
+                              <p:cond delay="0"/>
+                            </p:stCondLst>
+                            <p:childTnLst>
+                              <p:par>
+                                <p:cTn id="21" presetID="1" presetClass="entr" presetSubtype="0" fill="hold" nodeType="clickEffect">
+                                  <p:stCondLst>
+                                    <p:cond delay="0"/>
+                                  </p:stCondLst>
+                                  <p:childTnLst>
+                                    <p:set>
+                                      <p:cBhvr>
+                                        <p:cTn id="22" dur="1" fill="hold">
+                                          <p:stCondLst>
+                                            <p:cond delay="0"/>
+                                          </p:stCondLst>
+                                        </p:cTn>
+                                        <p:tgtEl>
+                                          <p:spTgt spid="3">
+                                            <p:txEl>
+                                              <p:pRg st="4" end="4"/>
+                                            </p:txEl>
+                                          </p:spTgt>
+                                        </p:tgtEl>
+                                        <p:attrNameLst>
+                                          <p:attrName>style.visibility</p:attrName>
+                                        </p:attrNameLst>
+                                      </p:cBhvr>
+                                      <p:to>
+                                        <p:strVal val="visible"/>
+                                      </p:to>
+                                    </p:set>
+                                  </p:childTnLst>
+                                </p:cTn>
+                              </p:par>
+                            </p:childTnLst>
+                          </p:cTn>
+                        </p:par>
+                      </p:childTnLst>
+                    </p:cTn>
+                  </p:par>
+                  <p:par>
+                    <p:cTn id="23" fill="hold">
+                      <p:stCondLst>
+                        <p:cond delay="indefinite"/>
+                      </p:stCondLst>
+                      <p:childTnLst>
+                        <p:par>
+                          <p:cTn id="24" fill="hold">
+                            <p:stCondLst>
+                              <p:cond delay="0"/>
+                            </p:stCondLst>
+                            <p:childTnLst>
+                              <p:par>
+                                <p:cTn id="25" presetID="1" presetClass="entr" presetSubtype="0" fill="hold" nodeType="clickEffect">
+                                  <p:stCondLst>
+                                    <p:cond delay="0"/>
+                                  </p:stCondLst>
+                                  <p:childTnLst>
+                                    <p:set>
+                                      <p:cBhvr>
+                                        <p:cTn id="26" dur="1" fill="hold">
+                                          <p:stCondLst>
+                                            <p:cond delay="0"/>
+                                          </p:stCondLst>
+                                        </p:cTn>
+                                        <p:tgtEl>
+                                          <p:spTgt spid="3">
+                                            <p:txEl>
+                                              <p:pRg st="5" end="5"/>
+                                            </p:txEl>
+                                          </p:spTgt>
+                                        </p:tgtEl>
+                                        <p:attrNameLst>
+                                          <p:attrName>style.visibility</p:attrName>
+                                        </p:attrNameLst>
+                                      </p:cBhvr>
+                                      <p:to>
+                                        <p:strVal val="visible"/>
+                                      </p:to>
+                                    </p:set>
+                                  </p:childTnLst>
+                                </p:cTn>
+                              </p:par>
+                            </p:childTnLst>
+                          </p:cTn>
+                        </p:par>
+                      </p:childTnLst>
+                    </p:cTn>
+                  </p:par>
+                </p:childTnLst>
+              </p:cTn>
+              <p:prevCondLst>
+                <p:cond evt="onPrev" delay="0">
+                  <p:tgtEl>
+                    <p:sldTgt/>
+                  </p:tgtEl>
+                </p:cond>
+              </p:prevCondLst>
+              <p:nextCondLst>
+                <p:cond evt="onNext" delay="0">
+                  <p:tgtEl>
+                    <p:sldTgt/>
+                  </p:tgtEl>
+                </p:cond>
+              </p:nextCondLst>
+            </p:seq>
+          </p:childTnLst>
+        </p:cTn>
+      </p:par>
+    </p:tnLst>
+  </p:timing>
 </p:sld>
 </file>
 
@@ -17171,6 +18689,343 @@
   <p:clrMapOvr>
     <a:masterClrMapping/>
   </p:clrMapOvr>
+  <p:timing>
+    <p:tnLst>
+      <p:par>
+        <p:cTn id="1" dur="indefinite" restart="never" nodeType="tmRoot">
+          <p:childTnLst>
+            <p:seq concurrent="1" nextAc="seek">
+              <p:cTn id="2" dur="indefinite" nodeType="mainSeq">
+                <p:childTnLst>
+                  <p:par>
+                    <p:cTn id="3" fill="hold">
+                      <p:stCondLst>
+                        <p:cond delay="indefinite"/>
+                      </p:stCondLst>
+                      <p:childTnLst>
+                        <p:par>
+                          <p:cTn id="4" fill="hold">
+                            <p:stCondLst>
+                              <p:cond delay="0"/>
+                            </p:stCondLst>
+                            <p:childTnLst>
+                              <p:par>
+                                <p:cTn id="5" presetID="1" presetClass="entr" presetSubtype="0" fill="hold" nodeType="clickEffect">
+                                  <p:stCondLst>
+                                    <p:cond delay="0"/>
+                                  </p:stCondLst>
+                                  <p:childTnLst>
+                                    <p:set>
+                                      <p:cBhvr>
+                                        <p:cTn id="6" dur="1" fill="hold">
+                                          <p:stCondLst>
+                                            <p:cond delay="0"/>
+                                          </p:stCondLst>
+                                        </p:cTn>
+                                        <p:tgtEl>
+                                          <p:spTgt spid="3">
+                                            <p:txEl>
+                                              <p:pRg st="0" end="0"/>
+                                            </p:txEl>
+                                          </p:spTgt>
+                                        </p:tgtEl>
+                                        <p:attrNameLst>
+                                          <p:attrName>style.visibility</p:attrName>
+                                        </p:attrNameLst>
+                                      </p:cBhvr>
+                                      <p:to>
+                                        <p:strVal val="visible"/>
+                                      </p:to>
+                                    </p:set>
+                                  </p:childTnLst>
+                                </p:cTn>
+                              </p:par>
+                            </p:childTnLst>
+                          </p:cTn>
+                        </p:par>
+                      </p:childTnLst>
+                    </p:cTn>
+                  </p:par>
+                  <p:par>
+                    <p:cTn id="7" fill="hold">
+                      <p:stCondLst>
+                        <p:cond delay="indefinite"/>
+                      </p:stCondLst>
+                      <p:childTnLst>
+                        <p:par>
+                          <p:cTn id="8" fill="hold">
+                            <p:stCondLst>
+                              <p:cond delay="0"/>
+                            </p:stCondLst>
+                            <p:childTnLst>
+                              <p:par>
+                                <p:cTn id="9" presetID="1" presetClass="entr" presetSubtype="0" fill="hold" nodeType="clickEffect">
+                                  <p:stCondLst>
+                                    <p:cond delay="0"/>
+                                  </p:stCondLst>
+                                  <p:childTnLst>
+                                    <p:set>
+                                      <p:cBhvr>
+                                        <p:cTn id="10" dur="1" fill="hold">
+                                          <p:stCondLst>
+                                            <p:cond delay="0"/>
+                                          </p:stCondLst>
+                                        </p:cTn>
+                                        <p:tgtEl>
+                                          <p:spTgt spid="3">
+                                            <p:txEl>
+                                              <p:pRg st="1" end="1"/>
+                                            </p:txEl>
+                                          </p:spTgt>
+                                        </p:tgtEl>
+                                        <p:attrNameLst>
+                                          <p:attrName>style.visibility</p:attrName>
+                                        </p:attrNameLst>
+                                      </p:cBhvr>
+                                      <p:to>
+                                        <p:strVal val="visible"/>
+                                      </p:to>
+                                    </p:set>
+                                  </p:childTnLst>
+                                </p:cTn>
+                              </p:par>
+                              <p:par>
+                                <p:cTn id="11" presetID="1" presetClass="entr" presetSubtype="0" fill="hold" nodeType="withEffect">
+                                  <p:stCondLst>
+                                    <p:cond delay="0"/>
+                                  </p:stCondLst>
+                                  <p:childTnLst>
+                                    <p:set>
+                                      <p:cBhvr>
+                                        <p:cTn id="12" dur="1" fill="hold">
+                                          <p:stCondLst>
+                                            <p:cond delay="0"/>
+                                          </p:stCondLst>
+                                        </p:cTn>
+                                        <p:tgtEl>
+                                          <p:spTgt spid="3">
+                                            <p:txEl>
+                                              <p:pRg st="2" end="2"/>
+                                            </p:txEl>
+                                          </p:spTgt>
+                                        </p:tgtEl>
+                                        <p:attrNameLst>
+                                          <p:attrName>style.visibility</p:attrName>
+                                        </p:attrNameLst>
+                                      </p:cBhvr>
+                                      <p:to>
+                                        <p:strVal val="visible"/>
+                                      </p:to>
+                                    </p:set>
+                                  </p:childTnLst>
+                                </p:cTn>
+                              </p:par>
+                              <p:par>
+                                <p:cTn id="13" presetID="1" presetClass="entr" presetSubtype="0" fill="hold" nodeType="withEffect">
+                                  <p:stCondLst>
+                                    <p:cond delay="0"/>
+                                  </p:stCondLst>
+                                  <p:childTnLst>
+                                    <p:set>
+                                      <p:cBhvr>
+                                        <p:cTn id="14" dur="1" fill="hold">
+                                          <p:stCondLst>
+                                            <p:cond delay="0"/>
+                                          </p:stCondLst>
+                                        </p:cTn>
+                                        <p:tgtEl>
+                                          <p:spTgt spid="3">
+                                            <p:txEl>
+                                              <p:pRg st="3" end="3"/>
+                                            </p:txEl>
+                                          </p:spTgt>
+                                        </p:tgtEl>
+                                        <p:attrNameLst>
+                                          <p:attrName>style.visibility</p:attrName>
+                                        </p:attrNameLst>
+                                      </p:cBhvr>
+                                      <p:to>
+                                        <p:strVal val="visible"/>
+                                      </p:to>
+                                    </p:set>
+                                  </p:childTnLst>
+                                </p:cTn>
+                              </p:par>
+                            </p:childTnLst>
+                          </p:cTn>
+                        </p:par>
+                      </p:childTnLst>
+                    </p:cTn>
+                  </p:par>
+                  <p:par>
+                    <p:cTn id="15" fill="hold">
+                      <p:stCondLst>
+                        <p:cond delay="indefinite"/>
+                      </p:stCondLst>
+                      <p:childTnLst>
+                        <p:par>
+                          <p:cTn id="16" fill="hold">
+                            <p:stCondLst>
+                              <p:cond delay="0"/>
+                            </p:stCondLst>
+                            <p:childTnLst>
+                              <p:par>
+                                <p:cTn id="17" presetID="1" presetClass="entr" presetSubtype="0" fill="hold" nodeType="clickEffect">
+                                  <p:stCondLst>
+                                    <p:cond delay="0"/>
+                                  </p:stCondLst>
+                                  <p:childTnLst>
+                                    <p:set>
+                                      <p:cBhvr>
+                                        <p:cTn id="18" dur="1" fill="hold">
+                                          <p:stCondLst>
+                                            <p:cond delay="0"/>
+                                          </p:stCondLst>
+                                        </p:cTn>
+                                        <p:tgtEl>
+                                          <p:spTgt spid="3">
+                                            <p:txEl>
+                                              <p:pRg st="4" end="4"/>
+                                            </p:txEl>
+                                          </p:spTgt>
+                                        </p:tgtEl>
+                                        <p:attrNameLst>
+                                          <p:attrName>style.visibility</p:attrName>
+                                        </p:attrNameLst>
+                                      </p:cBhvr>
+                                      <p:to>
+                                        <p:strVal val="visible"/>
+                                      </p:to>
+                                    </p:set>
+                                  </p:childTnLst>
+                                </p:cTn>
+                              </p:par>
+                            </p:childTnLst>
+                          </p:cTn>
+                        </p:par>
+                      </p:childTnLst>
+                    </p:cTn>
+                  </p:par>
+                  <p:par>
+                    <p:cTn id="19" fill="hold">
+                      <p:stCondLst>
+                        <p:cond delay="indefinite"/>
+                      </p:stCondLst>
+                      <p:childTnLst>
+                        <p:par>
+                          <p:cTn id="20" fill="hold">
+                            <p:stCondLst>
+                              <p:cond delay="0"/>
+                            </p:stCondLst>
+                            <p:childTnLst>
+                              <p:par>
+                                <p:cTn id="21" presetID="1" presetClass="entr" presetSubtype="0" fill="hold" nodeType="clickEffect">
+                                  <p:stCondLst>
+                                    <p:cond delay="0"/>
+                                  </p:stCondLst>
+                                  <p:childTnLst>
+                                    <p:set>
+                                      <p:cBhvr>
+                                        <p:cTn id="22" dur="1" fill="hold">
+                                          <p:stCondLst>
+                                            <p:cond delay="0"/>
+                                          </p:stCondLst>
+                                        </p:cTn>
+                                        <p:tgtEl>
+                                          <p:spTgt spid="3">
+                                            <p:txEl>
+                                              <p:pRg st="5" end="5"/>
+                                            </p:txEl>
+                                          </p:spTgt>
+                                        </p:tgtEl>
+                                        <p:attrNameLst>
+                                          <p:attrName>style.visibility</p:attrName>
+                                        </p:attrNameLst>
+                                      </p:cBhvr>
+                                      <p:to>
+                                        <p:strVal val="visible"/>
+                                      </p:to>
+                                    </p:set>
+                                  </p:childTnLst>
+                                </p:cTn>
+                              </p:par>
+                            </p:childTnLst>
+                          </p:cTn>
+                        </p:par>
+                      </p:childTnLst>
+                    </p:cTn>
+                  </p:par>
+                  <p:par>
+                    <p:cTn id="23" fill="hold">
+                      <p:stCondLst>
+                        <p:cond delay="indefinite"/>
+                      </p:stCondLst>
+                      <p:childTnLst>
+                        <p:par>
+                          <p:cTn id="24" fill="hold">
+                            <p:stCondLst>
+                              <p:cond delay="0"/>
+                            </p:stCondLst>
+                            <p:childTnLst>
+                              <p:par>
+                                <p:cTn id="25" presetID="1" presetClass="entr" presetSubtype="0" fill="hold" nodeType="clickEffect">
+                                  <p:stCondLst>
+                                    <p:cond delay="0"/>
+                                  </p:stCondLst>
+                                  <p:childTnLst>
+                                    <p:set>
+                                      <p:cBhvr>
+                                        <p:cTn id="26" dur="1" fill="hold">
+                                          <p:stCondLst>
+                                            <p:cond delay="0"/>
+                                          </p:stCondLst>
+                                        </p:cTn>
+                                        <p:tgtEl>
+                                          <p:spTgt spid="3">
+                                            <p:txEl>
+                                              <p:pRg st="6" end="6"/>
+                                            </p:txEl>
+                                          </p:spTgt>
+                                        </p:tgtEl>
+                                        <p:attrNameLst>
+                                          <p:attrName>style.visibility</p:attrName>
+                                        </p:attrNameLst>
+                                      </p:cBhvr>
+                                      <p:to>
+                                        <p:strVal val="visible"/>
+                                      </p:to>
+                                    </p:set>
+                                  </p:childTnLst>
+                                </p:cTn>
+                              </p:par>
+                            </p:childTnLst>
+                          </p:cTn>
+                        </p:par>
+                      </p:childTnLst>
+                    </p:cTn>
+                  </p:par>
+                </p:childTnLst>
+              </p:cTn>
+              <p:prevCondLst>
+                <p:cond evt="onPrev" delay="0">
+                  <p:tgtEl>
+                    <p:sldTgt/>
+                  </p:tgtEl>
+                </p:cond>
+              </p:prevCondLst>
+              <p:nextCondLst>
+                <p:cond evt="onNext" delay="0">
+                  <p:tgtEl>
+                    <p:sldTgt/>
+                  </p:tgtEl>
+                </p:cond>
+              </p:nextCondLst>
+            </p:seq>
+          </p:childTnLst>
+        </p:cTn>
+      </p:par>
+    </p:tnLst>
+  </p:timing>
 </p:sld>
 </file>
 
@@ -17567,7 +19422,7 @@
             <p:ph idx="1"/>
             <p:extLst>
               <p:ext uri="{D42A27DB-BD31-4B8C-83A1-F6EECF244321}">
-                <p14:modId xmlns:p14="http://schemas.microsoft.com/office/powerpoint/2010/main" val="3298089631"/>
+                <p14:modId xmlns:p14="http://schemas.microsoft.com/office/powerpoint/2010/main" val="99033778"/>
               </p:ext>
             </p:extLst>
           </p:nvPr>
@@ -17628,6 +19483,81 @@
   <p:clrMapOvr>
     <a:masterClrMapping/>
   </p:clrMapOvr>
+  <p:timing>
+    <p:tnLst>
+      <p:par>
+        <p:cTn id="1" dur="indefinite" restart="never" nodeType="tmRoot">
+          <p:childTnLst>
+            <p:seq concurrent="1" nextAc="seek">
+              <p:cTn id="2" dur="indefinite" nodeType="mainSeq">
+                <p:childTnLst>
+                  <p:par>
+                    <p:cTn id="3" fill="hold">
+                      <p:stCondLst>
+                        <p:cond delay="indefinite"/>
+                      </p:stCondLst>
+                      <p:childTnLst>
+                        <p:par>
+                          <p:cTn id="4" fill="hold">
+                            <p:stCondLst>
+                              <p:cond delay="0"/>
+                            </p:stCondLst>
+                            <p:childTnLst>
+                              <p:par>
+                                <p:cTn id="5" presetID="1" presetClass="entr" presetSubtype="0" fill="hold" nodeType="clickEffect">
+                                  <p:stCondLst>
+                                    <p:cond delay="0"/>
+                                  </p:stCondLst>
+                                  <p:childTnLst>
+                                    <p:set>
+                                      <p:cBhvr>
+                                        <p:cTn id="6" dur="1" fill="hold">
+                                          <p:stCondLst>
+                                            <p:cond delay="0"/>
+                                          </p:stCondLst>
+                                        </p:cTn>
+                                        <p:tgtEl>
+                                          <p:spTgt spid="5"/>
+                                        </p:tgtEl>
+                                        <p:attrNameLst>
+                                          <p:attrName>style.visibility</p:attrName>
+                                        </p:attrNameLst>
+                                      </p:cBhvr>
+                                      <p:to>
+                                        <p:strVal val="visible"/>
+                                      </p:to>
+                                    </p:set>
+                                  </p:childTnLst>
+                                </p:cTn>
+                              </p:par>
+                            </p:childTnLst>
+                          </p:cTn>
+                        </p:par>
+                      </p:childTnLst>
+                    </p:cTn>
+                  </p:par>
+                </p:childTnLst>
+              </p:cTn>
+              <p:prevCondLst>
+                <p:cond evt="onPrev" delay="0">
+                  <p:tgtEl>
+                    <p:sldTgt/>
+                  </p:tgtEl>
+                </p:cond>
+              </p:prevCondLst>
+              <p:nextCondLst>
+                <p:cond evt="onNext" delay="0">
+                  <p:tgtEl>
+                    <p:sldTgt/>
+                  </p:tgtEl>
+                </p:cond>
+              </p:nextCondLst>
+            </p:seq>
+          </p:childTnLst>
+        </p:cTn>
+      </p:par>
+    </p:tnLst>
+  </p:timing>
 </p:sld>
 </file>
 
@@ -18048,7 +19978,7 @@
             <p:ph idx="1"/>
             <p:extLst>
               <p:ext uri="{D42A27DB-BD31-4B8C-83A1-F6EECF244321}">
-                <p14:modId xmlns:p14="http://schemas.microsoft.com/office/powerpoint/2010/main" val="4293731533"/>
+                <p14:modId xmlns:p14="http://schemas.microsoft.com/office/powerpoint/2010/main" val="2680883299"/>
               </p:ext>
             </p:extLst>
           </p:nvPr>
@@ -18109,6 +20039,81 @@
   <p:clrMapOvr>
     <a:masterClrMapping/>
   </p:clrMapOvr>
+  <p:timing>
+    <p:tnLst>
+      <p:par>
+        <p:cTn id="1" dur="indefinite" restart="never" nodeType="tmRoot">
+          <p:childTnLst>
+            <p:seq concurrent="1" nextAc="seek">
+              <p:cTn id="2" dur="indefinite" nodeType="mainSeq">
+                <p:childTnLst>
+                  <p:par>
+                    <p:cTn id="3" fill="hold">
+                      <p:stCondLst>
+                        <p:cond delay="indefinite"/>
+                      </p:stCondLst>
+                      <p:childTnLst>
+                        <p:par>
+                          <p:cTn id="4" fill="hold">
+                            <p:stCondLst>
+                              <p:cond delay="0"/>
+                            </p:stCondLst>
+                            <p:childTnLst>
+                              <p:par>
+                                <p:cTn id="5" presetID="1" presetClass="entr" presetSubtype="0" fill="hold" nodeType="clickEffect">
+                                  <p:stCondLst>
+                                    <p:cond delay="0"/>
+                                  </p:stCondLst>
+                                  <p:childTnLst>
+                                    <p:set>
+                                      <p:cBhvr>
+                                        <p:cTn id="6" dur="1" fill="hold">
+                                          <p:stCondLst>
+                                            <p:cond delay="0"/>
+                                          </p:stCondLst>
+                                        </p:cTn>
+                                        <p:tgtEl>
+                                          <p:spTgt spid="9"/>
+                                        </p:tgtEl>
+                                        <p:attrNameLst>
+                                          <p:attrName>style.visibility</p:attrName>
+                                        </p:attrNameLst>
+                                      </p:cBhvr>
+                                      <p:to>
+                                        <p:strVal val="visible"/>
+                                      </p:to>
+                                    </p:set>
+                                  </p:childTnLst>
+                                </p:cTn>
+                              </p:par>
+                            </p:childTnLst>
+                          </p:cTn>
+                        </p:par>
+                      </p:childTnLst>
+                    </p:cTn>
+                  </p:par>
+                </p:childTnLst>
+              </p:cTn>
+              <p:prevCondLst>
+                <p:cond evt="onPrev" delay="0">
+                  <p:tgtEl>
+                    <p:sldTgt/>
+                  </p:tgtEl>
+                </p:cond>
+              </p:prevCondLst>
+              <p:nextCondLst>
+                <p:cond evt="onNext" delay="0">
+                  <p:tgtEl>
+                    <p:sldTgt/>
+                  </p:tgtEl>
+                </p:cond>
+              </p:nextCondLst>
+            </p:seq>
+          </p:childTnLst>
+        </p:cTn>
+      </p:par>
+    </p:tnLst>
+  </p:timing>
 </p:sld>
 </file>
 

</xml_diff>